<commit_message>
Modifico ppt para primera presentacion
</commit_message>
<xml_diff>
--- a/Diplomatura data science.pptx
+++ b/Diplomatura data science.pptx
@@ -12,11 +12,6 @@
     <p:sldId id="260" r:id="rId6"/>
     <p:sldId id="261" r:id="rId7"/>
     <p:sldId id="262" r:id="rId8"/>
-    <p:sldId id="263" r:id="rId9"/>
-    <p:sldId id="264" r:id="rId10"/>
-    <p:sldId id="265" r:id="rId11"/>
-    <p:sldId id="266" r:id="rId12"/>
-    <p:sldId id="267" r:id="rId13"/>
   </p:sldIdLst>
   <p:sldSz cx="12192000" cy="6858000"/>
   <p:notesSz cx="6858000" cy="9144000"/>
@@ -115,6 +110,11 @@
       </a:defRPr>
     </a:lvl9pPr>
   </p:defaultTextStyle>
+  <p:extLst>
+    <p:ext uri="{EFAFB233-063F-42B5-8137-9DF3F51BA10A}">
+      <p15:sldGuideLst xmlns:p15="http://schemas.microsoft.com/office/powerpoint/2012/main"/>
+    </p:ext>
+  </p:extLst>
 </p:presentation>
 </file>
 
@@ -168,7 +168,7 @@
           <a:noFill/>
           <a:extLst>
             <a:ext uri="{909E8E84-426E-40dd-AFC4-6F175D3DCCD1}">
-              <a14:hiddenFill xmlns:a14="http://schemas.microsoft.com/office/drawing/2010/main" xmlns="">
+              <a14:hiddenFill xmlns="" xmlns:a14="http://schemas.microsoft.com/office/drawing/2010/main">
                 <a:solidFill>
                   <a:srgbClr val="FFFFFF"/>
                 </a:solidFill>
@@ -228,7 +228,7 @@
             </a:ln>
             <a:extLst>
               <a:ext uri="{91240B29-F687-4f45-9708-019B960494DF}">
-                <a14:hiddenLine xmlns:a14="http://schemas.microsoft.com/office/drawing/2010/main" xmlns="" w="9525">
+                <a14:hiddenLine xmlns="" xmlns:a14="http://schemas.microsoft.com/office/drawing/2010/main" w="9525">
                   <a:solidFill>
                     <a:srgbClr val="000000"/>
                   </a:solidFill>
@@ -318,7 +318,7 @@
             </a:ln>
             <a:extLst>
               <a:ext uri="{91240B29-F687-4f45-9708-019B960494DF}">
-                <a14:hiddenLine xmlns:a14="http://schemas.microsoft.com/office/drawing/2010/main" xmlns="" w="9525">
+                <a14:hiddenLine xmlns="" xmlns:a14="http://schemas.microsoft.com/office/drawing/2010/main" w="9525">
                   <a:solidFill>
                     <a:srgbClr val="000000"/>
                   </a:solidFill>
@@ -408,7 +408,7 @@
             </a:ln>
             <a:extLst>
               <a:ext uri="{91240B29-F687-4f45-9708-019B960494DF}">
-                <a14:hiddenLine xmlns:a14="http://schemas.microsoft.com/office/drawing/2010/main" xmlns="" w="9525">
+                <a14:hiddenLine xmlns="" xmlns:a14="http://schemas.microsoft.com/office/drawing/2010/main" w="9525">
                   <a:solidFill>
                     <a:srgbClr val="000000"/>
                   </a:solidFill>
@@ -442,7 +442,7 @@
             </a:ln>
             <a:extLst>
               <a:ext uri="{91240B29-F687-4f45-9708-019B960494DF}">
-                <a14:hiddenLine xmlns:a14="http://schemas.microsoft.com/office/drawing/2010/main" xmlns="" w="9525">
+                <a14:hiddenLine xmlns="" xmlns:a14="http://schemas.microsoft.com/office/drawing/2010/main" w="9525">
                   <a:solidFill>
                     <a:srgbClr val="000000"/>
                   </a:solidFill>
@@ -532,7 +532,7 @@
             </a:ln>
             <a:extLst>
               <a:ext uri="{91240B29-F687-4f45-9708-019B960494DF}">
-                <a14:hiddenLine xmlns:a14="http://schemas.microsoft.com/office/drawing/2010/main" xmlns="" w="9525">
+                <a14:hiddenLine xmlns="" xmlns:a14="http://schemas.microsoft.com/office/drawing/2010/main" w="9525">
                   <a:solidFill>
                     <a:srgbClr val="000000"/>
                   </a:solidFill>
@@ -594,7 +594,7 @@
             </a:ln>
             <a:extLst>
               <a:ext uri="{91240B29-F687-4f45-9708-019B960494DF}">
-                <a14:hiddenLine xmlns:a14="http://schemas.microsoft.com/office/drawing/2010/main" xmlns="" w="9525">
+                <a14:hiddenLine xmlns="" xmlns:a14="http://schemas.microsoft.com/office/drawing/2010/main" w="9525">
                   <a:solidFill>
                     <a:srgbClr val="000000"/>
                   </a:solidFill>
@@ -656,7 +656,7 @@
             </a:ln>
             <a:extLst>
               <a:ext uri="{91240B29-F687-4f45-9708-019B960494DF}">
-                <a14:hiddenLine xmlns:a14="http://schemas.microsoft.com/office/drawing/2010/main" xmlns="" w="9525">
+                <a14:hiddenLine xmlns="" xmlns:a14="http://schemas.microsoft.com/office/drawing/2010/main" w="9525">
                   <a:solidFill>
                     <a:srgbClr val="000000"/>
                   </a:solidFill>
@@ -746,7 +746,7 @@
             </a:ln>
             <a:extLst>
               <a:ext uri="{91240B29-F687-4f45-9708-019B960494DF}">
-                <a14:hiddenLine xmlns:a14="http://schemas.microsoft.com/office/drawing/2010/main" xmlns="" w="9525">
+                <a14:hiddenLine xmlns="" xmlns:a14="http://schemas.microsoft.com/office/drawing/2010/main" w="9525">
                   <a:solidFill>
                     <a:srgbClr val="000000"/>
                   </a:solidFill>
@@ -808,7 +808,7 @@
             </a:ln>
             <a:extLst>
               <a:ext uri="{91240B29-F687-4f45-9708-019B960494DF}">
-                <a14:hiddenLine xmlns:a14="http://schemas.microsoft.com/office/drawing/2010/main" xmlns="" w="9525">
+                <a14:hiddenLine xmlns="" xmlns:a14="http://schemas.microsoft.com/office/drawing/2010/main" w="9525">
                   <a:solidFill>
                     <a:srgbClr val="000000"/>
                   </a:solidFill>
@@ -870,7 +870,7 @@
             </a:ln>
             <a:extLst>
               <a:ext uri="{91240B29-F687-4f45-9708-019B960494DF}">
-                <a14:hiddenLine xmlns:a14="http://schemas.microsoft.com/office/drawing/2010/main" xmlns="" w="9525">
+                <a14:hiddenLine xmlns="" xmlns:a14="http://schemas.microsoft.com/office/drawing/2010/main" w="9525">
                   <a:solidFill>
                     <a:srgbClr val="000000"/>
                   </a:solidFill>
@@ -960,7 +960,7 @@
             </a:ln>
             <a:extLst>
               <a:ext uri="{91240B29-F687-4f45-9708-019B960494DF}">
-                <a14:hiddenLine xmlns:a14="http://schemas.microsoft.com/office/drawing/2010/main" xmlns="" w="9525">
+                <a14:hiddenLine xmlns="" xmlns:a14="http://schemas.microsoft.com/office/drawing/2010/main" w="9525">
                   <a:solidFill>
                     <a:srgbClr val="000000"/>
                   </a:solidFill>
@@ -1050,7 +1050,7 @@
             </a:ln>
             <a:extLst>
               <a:ext uri="{91240B29-F687-4f45-9708-019B960494DF}">
-                <a14:hiddenLine xmlns:a14="http://schemas.microsoft.com/office/drawing/2010/main" xmlns="" w="9525">
+                <a14:hiddenLine xmlns="" xmlns:a14="http://schemas.microsoft.com/office/drawing/2010/main" w="9525">
                   <a:solidFill>
                     <a:srgbClr val="000000"/>
                   </a:solidFill>
@@ -1112,7 +1112,7 @@
             </a:ln>
             <a:extLst>
               <a:ext uri="{91240B29-F687-4f45-9708-019B960494DF}">
-                <a14:hiddenLine xmlns:a14="http://schemas.microsoft.com/office/drawing/2010/main" xmlns="" w="9525">
+                <a14:hiddenLine xmlns="" xmlns:a14="http://schemas.microsoft.com/office/drawing/2010/main" w="9525">
                   <a:solidFill>
                     <a:srgbClr val="000000"/>
                   </a:solidFill>
@@ -1222,7 +1222,7 @@
             </a:ln>
             <a:extLst>
               <a:ext uri="{91240B29-F687-4f45-9708-019B960494DF}">
-                <a14:hiddenLine xmlns:a14="http://schemas.microsoft.com/office/drawing/2010/main" xmlns="" w="9525">
+                <a14:hiddenLine xmlns="" xmlns:a14="http://schemas.microsoft.com/office/drawing/2010/main" w="9525">
                   <a:solidFill>
                     <a:srgbClr val="000000"/>
                   </a:solidFill>
@@ -1284,7 +1284,7 @@
             </a:ln>
             <a:extLst>
               <a:ext uri="{91240B29-F687-4f45-9708-019B960494DF}">
-                <a14:hiddenLine xmlns:a14="http://schemas.microsoft.com/office/drawing/2010/main" xmlns="" w="9525">
+                <a14:hiddenLine xmlns="" xmlns:a14="http://schemas.microsoft.com/office/drawing/2010/main" w="9525">
                   <a:solidFill>
                     <a:srgbClr val="000000"/>
                   </a:solidFill>
@@ -1374,7 +1374,7 @@
             </a:ln>
             <a:extLst>
               <a:ext uri="{91240B29-F687-4f45-9708-019B960494DF}">
-                <a14:hiddenLine xmlns:a14="http://schemas.microsoft.com/office/drawing/2010/main" xmlns="" w="9525">
+                <a14:hiddenLine xmlns="" xmlns:a14="http://schemas.microsoft.com/office/drawing/2010/main" w="9525">
                   <a:solidFill>
                     <a:srgbClr val="000000"/>
                   </a:solidFill>
@@ -1464,7 +1464,7 @@
             </a:ln>
             <a:extLst>
               <a:ext uri="{91240B29-F687-4f45-9708-019B960494DF}">
-                <a14:hiddenLine xmlns:a14="http://schemas.microsoft.com/office/drawing/2010/main" xmlns="" w="9525">
+                <a14:hiddenLine xmlns="" xmlns:a14="http://schemas.microsoft.com/office/drawing/2010/main" w="9525">
                   <a:solidFill>
                     <a:srgbClr val="000000"/>
                   </a:solidFill>
@@ -1526,7 +1526,7 @@
             </a:ln>
             <a:extLst>
               <a:ext uri="{91240B29-F687-4f45-9708-019B960494DF}">
-                <a14:hiddenLine xmlns:a14="http://schemas.microsoft.com/office/drawing/2010/main" xmlns="" w="9525">
+                <a14:hiddenLine xmlns="" xmlns:a14="http://schemas.microsoft.com/office/drawing/2010/main" w="9525">
                   <a:solidFill>
                     <a:srgbClr val="000000"/>
                   </a:solidFill>
@@ -1616,7 +1616,7 @@
             </a:ln>
             <a:extLst>
               <a:ext uri="{91240B29-F687-4f45-9708-019B960494DF}">
-                <a14:hiddenLine xmlns:a14="http://schemas.microsoft.com/office/drawing/2010/main" xmlns="" w="9525">
+                <a14:hiddenLine xmlns="" xmlns:a14="http://schemas.microsoft.com/office/drawing/2010/main" w="9525">
                   <a:solidFill>
                     <a:srgbClr val="000000"/>
                   </a:solidFill>
@@ -1706,7 +1706,7 @@
             </a:ln>
             <a:extLst>
               <a:ext uri="{91240B29-F687-4f45-9708-019B960494DF}">
-                <a14:hiddenLine xmlns:a14="http://schemas.microsoft.com/office/drawing/2010/main" xmlns="" w="9525">
+                <a14:hiddenLine xmlns="" xmlns:a14="http://schemas.microsoft.com/office/drawing/2010/main" w="9525">
                   <a:solidFill>
                     <a:srgbClr val="000000"/>
                   </a:solidFill>
@@ -1762,7 +1762,7 @@
             </a:ln>
             <a:extLst>
               <a:ext uri="{91240B29-F687-4f45-9708-019B960494DF}">
-                <a14:hiddenLine xmlns:a14="http://schemas.microsoft.com/office/drawing/2010/main" xmlns="" w="9525">
+                <a14:hiddenLine xmlns="" xmlns:a14="http://schemas.microsoft.com/office/drawing/2010/main" w="9525">
                   <a:solidFill>
                     <a:srgbClr val="000000"/>
                   </a:solidFill>
@@ -1852,7 +1852,7 @@
             </a:ln>
             <a:extLst>
               <a:ext uri="{91240B29-F687-4f45-9708-019B960494DF}">
-                <a14:hiddenLine xmlns:a14="http://schemas.microsoft.com/office/drawing/2010/main" xmlns="" w="9525">
+                <a14:hiddenLine xmlns="" xmlns:a14="http://schemas.microsoft.com/office/drawing/2010/main" w="9525">
                   <a:solidFill>
                     <a:srgbClr val="000000"/>
                   </a:solidFill>
@@ -1908,7 +1908,7 @@
             </a:ln>
             <a:extLst>
               <a:ext uri="{91240B29-F687-4f45-9708-019B960494DF}">
-                <a14:hiddenLine xmlns:a14="http://schemas.microsoft.com/office/drawing/2010/main" xmlns="" w="9525">
+                <a14:hiddenLine xmlns="" xmlns:a14="http://schemas.microsoft.com/office/drawing/2010/main" w="9525">
                   <a:solidFill>
                     <a:srgbClr val="000000"/>
                   </a:solidFill>
@@ -1998,7 +1998,7 @@
             </a:ln>
             <a:extLst>
               <a:ext uri="{91240B29-F687-4f45-9708-019B960494DF}">
-                <a14:hiddenLine xmlns:a14="http://schemas.microsoft.com/office/drawing/2010/main" xmlns="" w="9525">
+                <a14:hiddenLine xmlns="" xmlns:a14="http://schemas.microsoft.com/office/drawing/2010/main" w="9525">
                   <a:solidFill>
                     <a:srgbClr val="000000"/>
                   </a:solidFill>
@@ -2066,7 +2066,7 @@
             </a:ln>
             <a:extLst>
               <a:ext uri="{91240B29-F687-4f45-9708-019B960494DF}">
-                <a14:hiddenLine xmlns:a14="http://schemas.microsoft.com/office/drawing/2010/main" xmlns="" w="9525">
+                <a14:hiddenLine xmlns="" xmlns:a14="http://schemas.microsoft.com/office/drawing/2010/main" w="9525">
                   <a:solidFill>
                     <a:srgbClr val="000000"/>
                   </a:solidFill>
@@ -2156,7 +2156,7 @@
             </a:ln>
             <a:extLst>
               <a:ext uri="{91240B29-F687-4f45-9708-019B960494DF}">
-                <a14:hiddenLine xmlns:a14="http://schemas.microsoft.com/office/drawing/2010/main" xmlns="" w="9525">
+                <a14:hiddenLine xmlns="" xmlns:a14="http://schemas.microsoft.com/office/drawing/2010/main" w="9525">
                   <a:solidFill>
                     <a:srgbClr val="000000"/>
                   </a:solidFill>
@@ -2224,7 +2224,7 @@
             </a:ln>
             <a:extLst>
               <a:ext uri="{91240B29-F687-4f45-9708-019B960494DF}">
-                <a14:hiddenLine xmlns:a14="http://schemas.microsoft.com/office/drawing/2010/main" xmlns="" w="9525">
+                <a14:hiddenLine xmlns="" xmlns:a14="http://schemas.microsoft.com/office/drawing/2010/main" w="9525">
                   <a:solidFill>
                     <a:srgbClr val="000000"/>
                   </a:solidFill>
@@ -2314,7 +2314,7 @@
             </a:ln>
             <a:extLst>
               <a:ext uri="{91240B29-F687-4f45-9708-019B960494DF}">
-                <a14:hiddenLine xmlns:a14="http://schemas.microsoft.com/office/drawing/2010/main" xmlns="" w="9525">
+                <a14:hiddenLine xmlns="" xmlns:a14="http://schemas.microsoft.com/office/drawing/2010/main" w="9525">
                   <a:solidFill>
                     <a:srgbClr val="000000"/>
                   </a:solidFill>
@@ -2348,7 +2348,7 @@
             </a:ln>
             <a:extLst>
               <a:ext uri="{91240B29-F687-4f45-9708-019B960494DF}">
-                <a14:hiddenLine xmlns:a14="http://schemas.microsoft.com/office/drawing/2010/main" xmlns="" w="9525">
+                <a14:hiddenLine xmlns="" xmlns:a14="http://schemas.microsoft.com/office/drawing/2010/main" w="9525">
                   <a:solidFill>
                     <a:srgbClr val="000000"/>
                   </a:solidFill>
@@ -2438,7 +2438,7 @@
             </a:ln>
             <a:extLst>
               <a:ext uri="{91240B29-F687-4f45-9708-019B960494DF}">
-                <a14:hiddenLine xmlns:a14="http://schemas.microsoft.com/office/drawing/2010/main" xmlns="" w="9525">
+                <a14:hiddenLine xmlns="" xmlns:a14="http://schemas.microsoft.com/office/drawing/2010/main" w="9525">
                   <a:solidFill>
                     <a:srgbClr val="000000"/>
                   </a:solidFill>
@@ -2500,7 +2500,7 @@
             </a:ln>
             <a:extLst>
               <a:ext uri="{91240B29-F687-4f45-9708-019B960494DF}">
-                <a14:hiddenLine xmlns:a14="http://schemas.microsoft.com/office/drawing/2010/main" xmlns="" w="9525">
+                <a14:hiddenLine xmlns="" xmlns:a14="http://schemas.microsoft.com/office/drawing/2010/main" w="9525">
                   <a:solidFill>
                     <a:srgbClr val="000000"/>
                   </a:solidFill>
@@ -2562,7 +2562,7 @@
             </a:ln>
             <a:extLst>
               <a:ext uri="{91240B29-F687-4f45-9708-019B960494DF}">
-                <a14:hiddenLine xmlns:a14="http://schemas.microsoft.com/office/drawing/2010/main" xmlns="" w="9525">
+                <a14:hiddenLine xmlns="" xmlns:a14="http://schemas.microsoft.com/office/drawing/2010/main" w="9525">
                   <a:solidFill>
                     <a:srgbClr val="000000"/>
                   </a:solidFill>
@@ -2652,7 +2652,7 @@
             </a:ln>
             <a:extLst>
               <a:ext uri="{91240B29-F687-4f45-9708-019B960494DF}">
-                <a14:hiddenLine xmlns:a14="http://schemas.microsoft.com/office/drawing/2010/main" xmlns="" w="9525">
+                <a14:hiddenLine xmlns="" xmlns:a14="http://schemas.microsoft.com/office/drawing/2010/main" w="9525">
                   <a:solidFill>
                     <a:srgbClr val="000000"/>
                   </a:solidFill>
@@ -2720,7 +2720,7 @@
             </a:ln>
             <a:extLst>
               <a:ext uri="{91240B29-F687-4f45-9708-019B960494DF}">
-                <a14:hiddenLine xmlns:a14="http://schemas.microsoft.com/office/drawing/2010/main" xmlns="" w="9525">
+                <a14:hiddenLine xmlns="" xmlns:a14="http://schemas.microsoft.com/office/drawing/2010/main" w="9525">
                   <a:solidFill>
                     <a:srgbClr val="000000"/>
                   </a:solidFill>
@@ -2782,7 +2782,7 @@
             </a:ln>
             <a:extLst>
               <a:ext uri="{91240B29-F687-4f45-9708-019B960494DF}">
-                <a14:hiddenLine xmlns:a14="http://schemas.microsoft.com/office/drawing/2010/main" xmlns="" w="9525">
+                <a14:hiddenLine xmlns="" xmlns:a14="http://schemas.microsoft.com/office/drawing/2010/main" w="9525">
                   <a:solidFill>
                     <a:srgbClr val="000000"/>
                   </a:solidFill>
@@ -2872,7 +2872,7 @@
             </a:ln>
             <a:extLst>
               <a:ext uri="{91240B29-F687-4f45-9708-019B960494DF}">
-                <a14:hiddenLine xmlns:a14="http://schemas.microsoft.com/office/drawing/2010/main" xmlns="" w="9525">
+                <a14:hiddenLine xmlns="" xmlns:a14="http://schemas.microsoft.com/office/drawing/2010/main" w="9525">
                   <a:solidFill>
                     <a:srgbClr val="000000"/>
                   </a:solidFill>
@@ -2934,7 +2934,7 @@
             </a:ln>
             <a:extLst>
               <a:ext uri="{91240B29-F687-4f45-9708-019B960494DF}">
-                <a14:hiddenLine xmlns:a14="http://schemas.microsoft.com/office/drawing/2010/main" xmlns="" w="9525">
+                <a14:hiddenLine xmlns="" xmlns:a14="http://schemas.microsoft.com/office/drawing/2010/main" w="9525">
                   <a:solidFill>
                     <a:srgbClr val="000000"/>
                   </a:solidFill>
@@ -3024,7 +3024,7 @@
             </a:ln>
             <a:extLst>
               <a:ext uri="{91240B29-F687-4f45-9708-019B960494DF}">
-                <a14:hiddenLine xmlns:a14="http://schemas.microsoft.com/office/drawing/2010/main" xmlns="" w="9525">
+                <a14:hiddenLine xmlns="" xmlns:a14="http://schemas.microsoft.com/office/drawing/2010/main" w="9525">
                   <a:solidFill>
                     <a:srgbClr val="000000"/>
                   </a:solidFill>
@@ -3086,7 +3086,7 @@
             </a:ln>
             <a:extLst>
               <a:ext uri="{91240B29-F687-4f45-9708-019B960494DF}">
-                <a14:hiddenLine xmlns:a14="http://schemas.microsoft.com/office/drawing/2010/main" xmlns="" w="9525">
+                <a14:hiddenLine xmlns="" xmlns:a14="http://schemas.microsoft.com/office/drawing/2010/main" w="9525">
                   <a:solidFill>
                     <a:srgbClr val="000000"/>
                   </a:solidFill>
@@ -3176,7 +3176,7 @@
             </a:ln>
             <a:extLst>
               <a:ext uri="{91240B29-F687-4f45-9708-019B960494DF}">
-                <a14:hiddenLine xmlns:a14="http://schemas.microsoft.com/office/drawing/2010/main" xmlns="" w="9525">
+                <a14:hiddenLine xmlns="" xmlns:a14="http://schemas.microsoft.com/office/drawing/2010/main" w="9525">
                   <a:solidFill>
                     <a:srgbClr val="000000"/>
                   </a:solidFill>
@@ -3210,7 +3210,7 @@
             </a:ln>
             <a:extLst>
               <a:ext uri="{91240B29-F687-4f45-9708-019B960494DF}">
-                <a14:hiddenLine xmlns:a14="http://schemas.microsoft.com/office/drawing/2010/main" xmlns="" w="9525">
+                <a14:hiddenLine xmlns="" xmlns:a14="http://schemas.microsoft.com/office/drawing/2010/main" w="9525">
                   <a:solidFill>
                     <a:srgbClr val="000000"/>
                   </a:solidFill>
@@ -3275,7 +3275,7 @@
             </a:ln>
             <a:extLst>
               <a:ext uri="{91240B29-F687-4f45-9708-019B960494DF}">
-                <a14:hiddenLine xmlns:a14="http://schemas.microsoft.com/office/drawing/2010/main" xmlns="" w="9525">
+                <a14:hiddenLine xmlns="" xmlns:a14="http://schemas.microsoft.com/office/drawing/2010/main" w="9525">
                   <a:solidFill>
                     <a:srgbClr val="000000"/>
                   </a:solidFill>
@@ -3365,7 +3365,7 @@
             </a:ln>
             <a:extLst>
               <a:ext uri="{91240B29-F687-4f45-9708-019B960494DF}">
-                <a14:hiddenLine xmlns:a14="http://schemas.microsoft.com/office/drawing/2010/main" xmlns="" w="9525">
+                <a14:hiddenLine xmlns="" xmlns:a14="http://schemas.microsoft.com/office/drawing/2010/main" w="9525">
                   <a:solidFill>
                     <a:srgbClr val="000000"/>
                   </a:solidFill>
@@ -3427,7 +3427,7 @@
             </a:ln>
             <a:extLst>
               <a:ext uri="{91240B29-F687-4f45-9708-019B960494DF}">
-                <a14:hiddenLine xmlns:a14="http://schemas.microsoft.com/office/drawing/2010/main" xmlns="" w="9525">
+                <a14:hiddenLine xmlns="" xmlns:a14="http://schemas.microsoft.com/office/drawing/2010/main" w="9525">
                   <a:solidFill>
                     <a:srgbClr val="000000"/>
                   </a:solidFill>
@@ -3517,7 +3517,7 @@
             </a:ln>
             <a:extLst>
               <a:ext uri="{91240B29-F687-4f45-9708-019B960494DF}">
-                <a14:hiddenLine xmlns:a14="http://schemas.microsoft.com/office/drawing/2010/main" xmlns="" w="9525">
+                <a14:hiddenLine xmlns="" xmlns:a14="http://schemas.microsoft.com/office/drawing/2010/main" w="9525">
                   <a:solidFill>
                     <a:srgbClr val="000000"/>
                   </a:solidFill>
@@ -3607,7 +3607,7 @@
             </a:ln>
             <a:extLst>
               <a:ext uri="{91240B29-F687-4f45-9708-019B960494DF}">
-                <a14:hiddenLine xmlns:a14="http://schemas.microsoft.com/office/drawing/2010/main" xmlns="" w="9525">
+                <a14:hiddenLine xmlns="" xmlns:a14="http://schemas.microsoft.com/office/drawing/2010/main" w="9525">
                   <a:solidFill>
                     <a:srgbClr val="000000"/>
                   </a:solidFill>
@@ -3672,7 +3672,7 @@
             </a:ln>
             <a:extLst>
               <a:ext uri="{91240B29-F687-4f45-9708-019B960494DF}">
-                <a14:hiddenLine xmlns:a14="http://schemas.microsoft.com/office/drawing/2010/main" xmlns="" w="9525">
+                <a14:hiddenLine xmlns="" xmlns:a14="http://schemas.microsoft.com/office/drawing/2010/main" w="9525">
                   <a:solidFill>
                     <a:srgbClr val="000000"/>
                   </a:solidFill>
@@ -3734,7 +3734,7 @@
             </a:ln>
             <a:extLst>
               <a:ext uri="{91240B29-F687-4f45-9708-019B960494DF}">
-                <a14:hiddenLine xmlns:a14="http://schemas.microsoft.com/office/drawing/2010/main" xmlns="" w="9525">
+                <a14:hiddenLine xmlns="" xmlns:a14="http://schemas.microsoft.com/office/drawing/2010/main" w="9525">
                   <a:solidFill>
                     <a:srgbClr val="000000"/>
                   </a:solidFill>
@@ -3824,7 +3824,7 @@
             </a:ln>
             <a:extLst>
               <a:ext uri="{91240B29-F687-4f45-9708-019B960494DF}">
-                <a14:hiddenLine xmlns:a14="http://schemas.microsoft.com/office/drawing/2010/main" xmlns="" w="9525">
+                <a14:hiddenLine xmlns="" xmlns:a14="http://schemas.microsoft.com/office/drawing/2010/main" w="9525">
                   <a:solidFill>
                     <a:srgbClr val="000000"/>
                   </a:solidFill>
@@ -3914,7 +3914,7 @@
             </a:ln>
             <a:extLst>
               <a:ext uri="{91240B29-F687-4f45-9708-019B960494DF}">
-                <a14:hiddenLine xmlns:a14="http://schemas.microsoft.com/office/drawing/2010/main" xmlns="" w="9525">
+                <a14:hiddenLine xmlns="" xmlns:a14="http://schemas.microsoft.com/office/drawing/2010/main" w="9525">
                   <a:solidFill>
                     <a:srgbClr val="000000"/>
                   </a:solidFill>
@@ -3976,7 +3976,7 @@
             </a:ln>
             <a:extLst>
               <a:ext uri="{91240B29-F687-4f45-9708-019B960494DF}">
-                <a14:hiddenLine xmlns:a14="http://schemas.microsoft.com/office/drawing/2010/main" xmlns="" w="9525">
+                <a14:hiddenLine xmlns="" xmlns:a14="http://schemas.microsoft.com/office/drawing/2010/main" w="9525">
                   <a:solidFill>
                     <a:srgbClr val="000000"/>
                   </a:solidFill>
@@ -4096,7 +4096,7 @@
             </a:ln>
             <a:extLst>
               <a:ext uri="{91240B29-F687-4f45-9708-019B960494DF}">
-                <a14:hiddenLine xmlns:a14="http://schemas.microsoft.com/office/drawing/2010/main" xmlns="" w="9525">
+                <a14:hiddenLine xmlns="" xmlns:a14="http://schemas.microsoft.com/office/drawing/2010/main" w="9525">
                   <a:solidFill>
                     <a:srgbClr val="000000"/>
                   </a:solidFill>
@@ -4164,7 +4164,7 @@
             </a:ln>
             <a:extLst>
               <a:ext uri="{91240B29-F687-4f45-9708-019B960494DF}">
-                <a14:hiddenLine xmlns:a14="http://schemas.microsoft.com/office/drawing/2010/main" xmlns="" w="9525">
+                <a14:hiddenLine xmlns="" xmlns:a14="http://schemas.microsoft.com/office/drawing/2010/main" w="9525">
                   <a:solidFill>
                     <a:srgbClr val="000000"/>
                   </a:solidFill>
@@ -4254,7 +4254,7 @@
             </a:ln>
             <a:extLst>
               <a:ext uri="{91240B29-F687-4f45-9708-019B960494DF}">
-                <a14:hiddenLine xmlns:a14="http://schemas.microsoft.com/office/drawing/2010/main" xmlns="" w="9525">
+                <a14:hiddenLine xmlns="" xmlns:a14="http://schemas.microsoft.com/office/drawing/2010/main" w="9525">
                   <a:solidFill>
                     <a:srgbClr val="000000"/>
                   </a:solidFill>
@@ -4394,7 +4394,7 @@
           <a:p>
             <a:fld id="{48A87A34-81AB-432B-8DAE-1953F412C126}" type="datetimeFigureOut">
               <a:rPr lang="en-US" dirty="0"/>
-              <a:t>5/25/2020</a:t>
+              <a:t>5/26/2020</a:t>
             </a:fld>
             <a:endParaRPr lang="en-US" dirty="0"/>
           </a:p>
@@ -4656,7 +4656,7 @@
           <a:p>
             <a:fld id="{48A87A34-81AB-432B-8DAE-1953F412C126}" type="datetimeFigureOut">
               <a:rPr lang="en-US" dirty="0"/>
-              <a:t>5/25/2020</a:t>
+              <a:t>5/26/2020</a:t>
             </a:fld>
             <a:endParaRPr lang="en-US" dirty="0"/>
           </a:p>
@@ -4847,7 +4847,7 @@
           <a:p>
             <a:fld id="{48A87A34-81AB-432B-8DAE-1953F412C126}" type="datetimeFigureOut">
               <a:rPr lang="en-US" dirty="0"/>
-              <a:t>5/25/2020</a:t>
+              <a:t>5/26/2020</a:t>
             </a:fld>
             <a:endParaRPr lang="en-US" dirty="0"/>
           </a:p>
@@ -5105,7 +5105,7 @@
           <a:p>
             <a:fld id="{48A87A34-81AB-432B-8DAE-1953F412C126}" type="datetimeFigureOut">
               <a:rPr lang="en-US" dirty="0"/>
-              <a:t>5/25/2020</a:t>
+              <a:t>5/26/2020</a:t>
             </a:fld>
             <a:endParaRPr lang="en-US" dirty="0"/>
           </a:p>
@@ -5534,7 +5534,7 @@
           <a:p>
             <a:fld id="{48A87A34-81AB-432B-8DAE-1953F412C126}" type="datetimeFigureOut">
               <a:rPr lang="en-US" dirty="0"/>
-              <a:t>5/25/2020</a:t>
+              <a:t>5/26/2020</a:t>
             </a:fld>
             <a:endParaRPr lang="en-US" dirty="0"/>
           </a:p>
@@ -6075,7 +6075,7 @@
           <a:p>
             <a:fld id="{48A87A34-81AB-432B-8DAE-1953F412C126}" type="datetimeFigureOut">
               <a:rPr lang="en-US" dirty="0"/>
-              <a:t>5/25/2020</a:t>
+              <a:t>5/26/2020</a:t>
             </a:fld>
             <a:endParaRPr lang="en-US" dirty="0"/>
           </a:p>
@@ -6790,7 +6790,7 @@
           <a:p>
             <a:fld id="{48A87A34-81AB-432B-8DAE-1953F412C126}" type="datetimeFigureOut">
               <a:rPr lang="en-US" dirty="0"/>
-              <a:t>5/25/2020</a:t>
+              <a:t>5/26/2020</a:t>
             </a:fld>
             <a:endParaRPr lang="en-US" dirty="0"/>
           </a:p>
@@ -6955,7 +6955,7 @@
           <a:p>
             <a:fld id="{48A87A34-81AB-432B-8DAE-1953F412C126}" type="datetimeFigureOut">
               <a:rPr lang="en-US" dirty="0"/>
-              <a:t>5/25/2020</a:t>
+              <a:t>5/26/2020</a:t>
             </a:fld>
             <a:endParaRPr lang="en-US" dirty="0"/>
           </a:p>
@@ -7130,7 +7130,7 @@
           <a:p>
             <a:fld id="{48A87A34-81AB-432B-8DAE-1953F412C126}" type="datetimeFigureOut">
               <a:rPr lang="en-US" dirty="0"/>
-              <a:t>5/25/2020</a:t>
+              <a:t>5/26/2020</a:t>
             </a:fld>
             <a:endParaRPr lang="en-US" dirty="0"/>
           </a:p>
@@ -7295,7 +7295,7 @@
           <a:p>
             <a:fld id="{48A87A34-81AB-432B-8DAE-1953F412C126}" type="datetimeFigureOut">
               <a:rPr lang="en-US" dirty="0"/>
-              <a:t>5/25/2020</a:t>
+              <a:t>5/26/2020</a:t>
             </a:fld>
             <a:endParaRPr lang="en-US" dirty="0"/>
           </a:p>
@@ -7540,7 +7540,7 @@
           <a:p>
             <a:fld id="{48A87A34-81AB-432B-8DAE-1953F412C126}" type="datetimeFigureOut">
               <a:rPr lang="en-US" dirty="0"/>
-              <a:t>5/25/2020</a:t>
+              <a:t>5/26/2020</a:t>
             </a:fld>
             <a:endParaRPr lang="en-US" dirty="0"/>
           </a:p>
@@ -7767,7 +7767,7 @@
           <a:p>
             <a:fld id="{48A87A34-81AB-432B-8DAE-1953F412C126}" type="datetimeFigureOut">
               <a:rPr lang="en-US" dirty="0"/>
-              <a:t>5/25/2020</a:t>
+              <a:t>5/26/2020</a:t>
             </a:fld>
             <a:endParaRPr lang="en-US" dirty="0"/>
           </a:p>
@@ -8143,7 +8143,7 @@
           <a:p>
             <a:fld id="{48A87A34-81AB-432B-8DAE-1953F412C126}" type="datetimeFigureOut">
               <a:rPr lang="en-US" dirty="0"/>
-              <a:t>5/25/2020</a:t>
+              <a:t>5/26/2020</a:t>
             </a:fld>
             <a:endParaRPr lang="en-US" dirty="0"/>
           </a:p>
@@ -8256,7 +8256,7 @@
           <a:p>
             <a:fld id="{48A87A34-81AB-432B-8DAE-1953F412C126}" type="datetimeFigureOut">
               <a:rPr lang="en-US" dirty="0"/>
-              <a:t>5/25/2020</a:t>
+              <a:t>5/26/2020</a:t>
             </a:fld>
             <a:endParaRPr lang="en-US" dirty="0"/>
           </a:p>
@@ -8346,7 +8346,7 @@
           <a:p>
             <a:fld id="{48A87A34-81AB-432B-8DAE-1953F412C126}" type="datetimeFigureOut">
               <a:rPr lang="en-US" dirty="0"/>
-              <a:t>5/25/2020</a:t>
+              <a:t>5/26/2020</a:t>
             </a:fld>
             <a:endParaRPr lang="en-US" dirty="0"/>
           </a:p>
@@ -8590,7 +8590,7 @@
           <a:p>
             <a:fld id="{48A87A34-81AB-432B-8DAE-1953F412C126}" type="datetimeFigureOut">
               <a:rPr lang="en-US" dirty="0"/>
-              <a:t>5/25/2020</a:t>
+              <a:t>5/26/2020</a:t>
             </a:fld>
             <a:endParaRPr lang="en-US" dirty="0"/>
           </a:p>
@@ -8865,7 +8865,7 @@
           <a:p>
             <a:fld id="{48A87A34-81AB-432B-8DAE-1953F412C126}" type="datetimeFigureOut">
               <a:rPr lang="en-US" dirty="0"/>
-              <a:t>5/25/2020</a:t>
+              <a:t>5/26/2020</a:t>
             </a:fld>
             <a:endParaRPr lang="en-US" dirty="0"/>
           </a:p>
@@ -8976,7 +8976,7 @@
           <a:noFill/>
           <a:extLst>
             <a:ext uri="{909E8E84-426E-40dd-AFC4-6F175D3DCCD1}">
-              <a14:hiddenFill xmlns:a14="http://schemas.microsoft.com/office/drawing/2010/main" xmlns="">
+              <a14:hiddenFill xmlns="" xmlns:a14="http://schemas.microsoft.com/office/drawing/2010/main">
                 <a:solidFill>
                   <a:srgbClr val="FFFFFF"/>
                 </a:solidFill>
@@ -9050,7 +9050,7 @@
               </a:ln>
               <a:extLst>
                 <a:ext uri="{91240B29-F687-4f45-9708-019B960494DF}">
-                  <a14:hiddenLine xmlns:a14="http://schemas.microsoft.com/office/drawing/2010/main" xmlns="" w="9525">
+                  <a14:hiddenLine xmlns="" xmlns:a14="http://schemas.microsoft.com/office/drawing/2010/main" w="9525">
                     <a:solidFill>
                       <a:srgbClr val="000000"/>
                     </a:solidFill>
@@ -9140,7 +9140,7 @@
               </a:ln>
               <a:extLst>
                 <a:ext uri="{91240B29-F687-4f45-9708-019B960494DF}">
-                  <a14:hiddenLine xmlns:a14="http://schemas.microsoft.com/office/drawing/2010/main" xmlns="" w="9525">
+                  <a14:hiddenLine xmlns="" xmlns:a14="http://schemas.microsoft.com/office/drawing/2010/main" w="9525">
                     <a:solidFill>
                       <a:srgbClr val="000000"/>
                     </a:solidFill>
@@ -9230,7 +9230,7 @@
               </a:ln>
               <a:extLst>
                 <a:ext uri="{91240B29-F687-4f45-9708-019B960494DF}">
-                  <a14:hiddenLine xmlns:a14="http://schemas.microsoft.com/office/drawing/2010/main" xmlns="" w="9525">
+                  <a14:hiddenLine xmlns="" xmlns:a14="http://schemas.microsoft.com/office/drawing/2010/main" w="9525">
                     <a:solidFill>
                       <a:srgbClr val="000000"/>
                     </a:solidFill>
@@ -9292,7 +9292,7 @@
               </a:ln>
               <a:extLst>
                 <a:ext uri="{91240B29-F687-4f45-9708-019B960494DF}">
-                  <a14:hiddenLine xmlns:a14="http://schemas.microsoft.com/office/drawing/2010/main" xmlns="" w="9525">
+                  <a14:hiddenLine xmlns="" xmlns:a14="http://schemas.microsoft.com/office/drawing/2010/main" w="9525">
                     <a:solidFill>
                       <a:srgbClr val="000000"/>
                     </a:solidFill>
@@ -9382,7 +9382,7 @@
               </a:ln>
               <a:extLst>
                 <a:ext uri="{91240B29-F687-4f45-9708-019B960494DF}">
-                  <a14:hiddenLine xmlns:a14="http://schemas.microsoft.com/office/drawing/2010/main" xmlns="" w="9525">
+                  <a14:hiddenLine xmlns="" xmlns:a14="http://schemas.microsoft.com/office/drawing/2010/main" w="9525">
                     <a:solidFill>
                       <a:srgbClr val="000000"/>
                     </a:solidFill>
@@ -9444,7 +9444,7 @@
               </a:ln>
               <a:extLst>
                 <a:ext uri="{91240B29-F687-4f45-9708-019B960494DF}">
-                  <a14:hiddenLine xmlns:a14="http://schemas.microsoft.com/office/drawing/2010/main" xmlns="" w="9525">
+                  <a14:hiddenLine xmlns="" xmlns:a14="http://schemas.microsoft.com/office/drawing/2010/main" w="9525">
                     <a:solidFill>
                       <a:srgbClr val="000000"/>
                     </a:solidFill>
@@ -9506,7 +9506,7 @@
               </a:ln>
               <a:extLst>
                 <a:ext uri="{91240B29-F687-4f45-9708-019B960494DF}">
-                  <a14:hiddenLine xmlns:a14="http://schemas.microsoft.com/office/drawing/2010/main" xmlns="" w="9525">
+                  <a14:hiddenLine xmlns="" xmlns:a14="http://schemas.microsoft.com/office/drawing/2010/main" w="9525">
                     <a:solidFill>
                       <a:srgbClr val="000000"/>
                     </a:solidFill>
@@ -9596,7 +9596,7 @@
               </a:ln>
               <a:extLst>
                 <a:ext uri="{91240B29-F687-4f45-9708-019B960494DF}">
-                  <a14:hiddenLine xmlns:a14="http://schemas.microsoft.com/office/drawing/2010/main" xmlns="" w="9525">
+                  <a14:hiddenLine xmlns="" xmlns:a14="http://schemas.microsoft.com/office/drawing/2010/main" w="9525">
                     <a:solidFill>
                       <a:srgbClr val="000000"/>
                     </a:solidFill>
@@ -9686,7 +9686,7 @@
               </a:ln>
               <a:extLst>
                 <a:ext uri="{91240B29-F687-4f45-9708-019B960494DF}">
-                  <a14:hiddenLine xmlns:a14="http://schemas.microsoft.com/office/drawing/2010/main" xmlns="" w="9525">
+                  <a14:hiddenLine xmlns="" xmlns:a14="http://schemas.microsoft.com/office/drawing/2010/main" w="9525">
                     <a:solidFill>
                       <a:srgbClr val="000000"/>
                     </a:solidFill>
@@ -9748,7 +9748,7 @@
               </a:ln>
               <a:extLst>
                 <a:ext uri="{91240B29-F687-4f45-9708-019B960494DF}">
-                  <a14:hiddenLine xmlns:a14="http://schemas.microsoft.com/office/drawing/2010/main" xmlns="" w="9525">
+                  <a14:hiddenLine xmlns="" xmlns:a14="http://schemas.microsoft.com/office/drawing/2010/main" w="9525">
                     <a:solidFill>
                       <a:srgbClr val="000000"/>
                     </a:solidFill>
@@ -9858,7 +9858,7 @@
               </a:ln>
               <a:extLst>
                 <a:ext uri="{91240B29-F687-4f45-9708-019B960494DF}">
-                  <a14:hiddenLine xmlns:a14="http://schemas.microsoft.com/office/drawing/2010/main" xmlns="" w="9525">
+                  <a14:hiddenLine xmlns="" xmlns:a14="http://schemas.microsoft.com/office/drawing/2010/main" w="9525">
                     <a:solidFill>
                       <a:srgbClr val="000000"/>
                     </a:solidFill>
@@ -9942,7 +9942,7 @@
               </a:ln>
               <a:extLst>
                 <a:ext uri="{91240B29-F687-4f45-9708-019B960494DF}">
-                  <a14:hiddenLine xmlns:a14="http://schemas.microsoft.com/office/drawing/2010/main" xmlns="" w="9525">
+                  <a14:hiddenLine xmlns="" xmlns:a14="http://schemas.microsoft.com/office/drawing/2010/main" w="9525">
                     <a:solidFill>
                       <a:srgbClr val="000000"/>
                     </a:solidFill>
@@ -10004,7 +10004,7 @@
               </a:ln>
               <a:extLst>
                 <a:ext uri="{91240B29-F687-4f45-9708-019B960494DF}">
-                  <a14:hiddenLine xmlns:a14="http://schemas.microsoft.com/office/drawing/2010/main" xmlns="" w="9525">
+                  <a14:hiddenLine xmlns="" xmlns:a14="http://schemas.microsoft.com/office/drawing/2010/main" w="9525">
                     <a:solidFill>
                       <a:srgbClr val="000000"/>
                     </a:solidFill>
@@ -10066,7 +10066,7 @@
               </a:ln>
               <a:extLst>
                 <a:ext uri="{91240B29-F687-4f45-9708-019B960494DF}">
-                  <a14:hiddenLine xmlns:a14="http://schemas.microsoft.com/office/drawing/2010/main" xmlns="" w="9525">
+                  <a14:hiddenLine xmlns="" xmlns:a14="http://schemas.microsoft.com/office/drawing/2010/main" w="9525">
                     <a:solidFill>
                       <a:srgbClr val="000000"/>
                     </a:solidFill>
@@ -10156,7 +10156,7 @@
               </a:ln>
               <a:extLst>
                 <a:ext uri="{91240B29-F687-4f45-9708-019B960494DF}">
-                  <a14:hiddenLine xmlns:a14="http://schemas.microsoft.com/office/drawing/2010/main" xmlns="" w="9525">
+                  <a14:hiddenLine xmlns="" xmlns:a14="http://schemas.microsoft.com/office/drawing/2010/main" w="9525">
                     <a:solidFill>
                       <a:srgbClr val="000000"/>
                     </a:solidFill>
@@ -10190,7 +10190,7 @@
               </a:ln>
               <a:extLst>
                 <a:ext uri="{91240B29-F687-4f45-9708-019B960494DF}">
-                  <a14:hiddenLine xmlns:a14="http://schemas.microsoft.com/office/drawing/2010/main" xmlns="" w="9525">
+                  <a14:hiddenLine xmlns="" xmlns:a14="http://schemas.microsoft.com/office/drawing/2010/main" w="9525">
                     <a:solidFill>
                       <a:srgbClr val="000000"/>
                     </a:solidFill>
@@ -10255,7 +10255,7 @@
               </a:ln>
               <a:extLst>
                 <a:ext uri="{91240B29-F687-4f45-9708-019B960494DF}">
-                  <a14:hiddenLine xmlns:a14="http://schemas.microsoft.com/office/drawing/2010/main" xmlns="" w="9525">
+                  <a14:hiddenLine xmlns="" xmlns:a14="http://schemas.microsoft.com/office/drawing/2010/main" w="9525">
                     <a:solidFill>
                       <a:srgbClr val="000000"/>
                     </a:solidFill>
@@ -10345,7 +10345,7 @@
               </a:ln>
               <a:extLst>
                 <a:ext uri="{91240B29-F687-4f45-9708-019B960494DF}">
-                  <a14:hiddenLine xmlns:a14="http://schemas.microsoft.com/office/drawing/2010/main" xmlns="" w="9525">
+                  <a14:hiddenLine xmlns="" xmlns:a14="http://schemas.microsoft.com/office/drawing/2010/main" w="9525">
                     <a:solidFill>
                       <a:srgbClr val="000000"/>
                     </a:solidFill>
@@ -10407,7 +10407,7 @@
               </a:ln>
               <a:extLst>
                 <a:ext uri="{91240B29-F687-4f45-9708-019B960494DF}">
-                  <a14:hiddenLine xmlns:a14="http://schemas.microsoft.com/office/drawing/2010/main" xmlns="" w="9525">
+                  <a14:hiddenLine xmlns="" xmlns:a14="http://schemas.microsoft.com/office/drawing/2010/main" w="9525">
                     <a:solidFill>
                       <a:srgbClr val="000000"/>
                     </a:solidFill>
@@ -10497,7 +10497,7 @@
               </a:ln>
               <a:extLst>
                 <a:ext uri="{91240B29-F687-4f45-9708-019B960494DF}">
-                  <a14:hiddenLine xmlns:a14="http://schemas.microsoft.com/office/drawing/2010/main" xmlns="" w="9525">
+                  <a14:hiddenLine xmlns="" xmlns:a14="http://schemas.microsoft.com/office/drawing/2010/main" w="9525">
                     <a:solidFill>
                       <a:srgbClr val="000000"/>
                     </a:solidFill>
@@ -10562,7 +10562,7 @@
               </a:ln>
               <a:extLst>
                 <a:ext uri="{91240B29-F687-4f45-9708-019B960494DF}">
-                  <a14:hiddenLine xmlns:a14="http://schemas.microsoft.com/office/drawing/2010/main" xmlns="" w="9525">
+                  <a14:hiddenLine xmlns="" xmlns:a14="http://schemas.microsoft.com/office/drawing/2010/main" w="9525">
                     <a:solidFill>
                       <a:srgbClr val="000000"/>
                     </a:solidFill>
@@ -10624,7 +10624,7 @@
               </a:ln>
               <a:extLst>
                 <a:ext uri="{91240B29-F687-4f45-9708-019B960494DF}">
-                  <a14:hiddenLine xmlns:a14="http://schemas.microsoft.com/office/drawing/2010/main" xmlns="" w="9525">
+                  <a14:hiddenLine xmlns="" xmlns:a14="http://schemas.microsoft.com/office/drawing/2010/main" w="9525">
                     <a:solidFill>
                       <a:srgbClr val="000000"/>
                     </a:solidFill>
@@ -10714,7 +10714,7 @@
               </a:ln>
               <a:extLst>
                 <a:ext uri="{91240B29-F687-4f45-9708-019B960494DF}">
-                  <a14:hiddenLine xmlns:a14="http://schemas.microsoft.com/office/drawing/2010/main" xmlns="" w="9525">
+                  <a14:hiddenLine xmlns="" xmlns:a14="http://schemas.microsoft.com/office/drawing/2010/main" w="9525">
                     <a:solidFill>
                       <a:srgbClr val="000000"/>
                     </a:solidFill>
@@ -10804,7 +10804,7 @@
               </a:ln>
               <a:extLst>
                 <a:ext uri="{91240B29-F687-4f45-9708-019B960494DF}">
-                  <a14:hiddenLine xmlns:a14="http://schemas.microsoft.com/office/drawing/2010/main" xmlns="" w="9525">
+                  <a14:hiddenLine xmlns="" xmlns:a14="http://schemas.microsoft.com/office/drawing/2010/main" w="9525">
                     <a:solidFill>
                       <a:srgbClr val="000000"/>
                     </a:solidFill>
@@ -10869,7 +10869,7 @@
               </a:ln>
               <a:extLst>
                 <a:ext uri="{91240B29-F687-4f45-9708-019B960494DF}">
-                  <a14:hiddenLine xmlns:a14="http://schemas.microsoft.com/office/drawing/2010/main" xmlns="" w="9525">
+                  <a14:hiddenLine xmlns="" xmlns:a14="http://schemas.microsoft.com/office/drawing/2010/main" w="9525">
                     <a:solidFill>
                       <a:srgbClr val="000000"/>
                     </a:solidFill>
@@ -10989,7 +10989,7 @@
               </a:ln>
               <a:extLst>
                 <a:ext uri="{91240B29-F687-4f45-9708-019B960494DF}">
-                  <a14:hiddenLine xmlns:a14="http://schemas.microsoft.com/office/drawing/2010/main" xmlns="" w="9525">
+                  <a14:hiddenLine xmlns="" xmlns:a14="http://schemas.microsoft.com/office/drawing/2010/main" w="9525">
                     <a:solidFill>
                       <a:srgbClr val="000000"/>
                     </a:solidFill>
@@ -11087,7 +11087,7 @@
               </a:ln>
               <a:extLst>
                 <a:ext uri="{91240B29-F687-4f45-9708-019B960494DF}">
-                  <a14:hiddenLine xmlns:a14="http://schemas.microsoft.com/office/drawing/2010/main" xmlns="" w="9525">
+                  <a14:hiddenLine xmlns="" xmlns:a14="http://schemas.microsoft.com/office/drawing/2010/main" w="9525">
                     <a:solidFill>
                       <a:srgbClr val="000000"/>
                     </a:solidFill>
@@ -11202,7 +11202,7 @@
               </a:ln>
               <a:extLst>
                 <a:ext uri="{91240B29-F687-4f45-9708-019B960494DF}">
-                  <a14:hiddenLine xmlns:a14="http://schemas.microsoft.com/office/drawing/2010/main" xmlns="" w="9525">
+                  <a14:hiddenLine xmlns="" xmlns:a14="http://schemas.microsoft.com/office/drawing/2010/main" w="9525">
                     <a:solidFill>
                       <a:srgbClr val="000000"/>
                     </a:solidFill>
@@ -11292,7 +11292,7 @@
               </a:ln>
               <a:extLst>
                 <a:ext uri="{91240B29-F687-4f45-9708-019B960494DF}">
-                  <a14:hiddenLine xmlns:a14="http://schemas.microsoft.com/office/drawing/2010/main" xmlns="" w="9525">
+                  <a14:hiddenLine xmlns="" xmlns:a14="http://schemas.microsoft.com/office/drawing/2010/main" w="9525">
                     <a:solidFill>
                       <a:srgbClr val="000000"/>
                     </a:solidFill>
@@ -11357,7 +11357,7 @@
               </a:ln>
               <a:extLst>
                 <a:ext uri="{91240B29-F687-4f45-9708-019B960494DF}">
-                  <a14:hiddenLine xmlns:a14="http://schemas.microsoft.com/office/drawing/2010/main" xmlns="" w="9525">
+                  <a14:hiddenLine xmlns="" xmlns:a14="http://schemas.microsoft.com/office/drawing/2010/main" w="9525">
                     <a:solidFill>
                       <a:srgbClr val="000000"/>
                     </a:solidFill>
@@ -11447,7 +11447,7 @@
               </a:ln>
               <a:extLst>
                 <a:ext uri="{91240B29-F687-4f45-9708-019B960494DF}">
-                  <a14:hiddenLine xmlns:a14="http://schemas.microsoft.com/office/drawing/2010/main" xmlns="" w="9525">
+                  <a14:hiddenLine xmlns="" xmlns:a14="http://schemas.microsoft.com/office/drawing/2010/main" w="9525">
                     <a:solidFill>
                       <a:srgbClr val="000000"/>
                     </a:solidFill>
@@ -11515,7 +11515,7 @@
               </a:ln>
               <a:extLst>
                 <a:ext uri="{91240B29-F687-4f45-9708-019B960494DF}">
-                  <a14:hiddenLine xmlns:a14="http://schemas.microsoft.com/office/drawing/2010/main" xmlns="" w="9525">
+                  <a14:hiddenLine xmlns="" xmlns:a14="http://schemas.microsoft.com/office/drawing/2010/main" w="9525">
                     <a:solidFill>
                       <a:srgbClr val="000000"/>
                     </a:solidFill>
@@ -11605,7 +11605,7 @@
               </a:ln>
               <a:extLst>
                 <a:ext uri="{91240B29-F687-4f45-9708-019B960494DF}">
-                  <a14:hiddenLine xmlns:a14="http://schemas.microsoft.com/office/drawing/2010/main" xmlns="" w="9525">
+                  <a14:hiddenLine xmlns="" xmlns:a14="http://schemas.microsoft.com/office/drawing/2010/main" w="9525">
                     <a:solidFill>
                       <a:srgbClr val="000000"/>
                     </a:solidFill>
@@ -11673,7 +11673,7 @@
               </a:ln>
               <a:extLst>
                 <a:ext uri="{91240B29-F687-4f45-9708-019B960494DF}">
-                  <a14:hiddenLine xmlns:a14="http://schemas.microsoft.com/office/drawing/2010/main" xmlns="" w="9525">
+                  <a14:hiddenLine xmlns="" xmlns:a14="http://schemas.microsoft.com/office/drawing/2010/main" w="9525">
                     <a:solidFill>
                       <a:srgbClr val="000000"/>
                     </a:solidFill>
@@ -11763,7 +11763,7 @@
               </a:ln>
               <a:extLst>
                 <a:ext uri="{91240B29-F687-4f45-9708-019B960494DF}">
-                  <a14:hiddenLine xmlns:a14="http://schemas.microsoft.com/office/drawing/2010/main" xmlns="" w="9525">
+                  <a14:hiddenLine xmlns="" xmlns:a14="http://schemas.microsoft.com/office/drawing/2010/main" w="9525">
                     <a:solidFill>
                       <a:srgbClr val="000000"/>
                     </a:solidFill>
@@ -11797,7 +11797,7 @@
               </a:ln>
               <a:extLst>
                 <a:ext uri="{91240B29-F687-4f45-9708-019B960494DF}">
-                  <a14:hiddenLine xmlns:a14="http://schemas.microsoft.com/office/drawing/2010/main" xmlns="" w="9525">
+                  <a14:hiddenLine xmlns="" xmlns:a14="http://schemas.microsoft.com/office/drawing/2010/main" w="9525">
                     <a:solidFill>
                       <a:srgbClr val="000000"/>
                     </a:solidFill>
@@ -11938,7 +11938,7 @@
             <a:fld id="{48A87A34-81AB-432B-8DAE-1953F412C126}" type="datetimeFigureOut">
               <a:rPr lang="en-US" dirty="0"/>
               <a:pPr/>
-              <a:t>5/25/2020</a:t>
+              <a:t>5/26/2020</a:t>
             </a:fld>
             <a:endParaRPr lang="en-US" dirty="0"/>
           </a:p>
@@ -12447,210 +12447,6 @@
 </p:sld>
 </file>
 
-<file path=ppt/slides/slide10.xml><?xml version="1.0" encoding="utf-8"?>
-<p:sld xmlns:a="http://schemas.openxmlformats.org/drawingml/2006/main" xmlns:r="http://schemas.openxmlformats.org/officeDocument/2006/relationships" xmlns:p="http://schemas.openxmlformats.org/presentationml/2006/main">
-  <p:cSld>
-    <p:spTree>
-      <p:nvGrpSpPr>
-        <p:cNvPr id="1" name=""/>
-        <p:cNvGrpSpPr/>
-        <p:nvPr/>
-      </p:nvGrpSpPr>
-      <p:grpSpPr>
-        <a:xfrm>
-          <a:off x="0" y="0"/>
-          <a:ext cx="0" cy="0"/>
-          <a:chOff x="0" y="0"/>
-          <a:chExt cx="0" cy="0"/>
-        </a:xfrm>
-      </p:grpSpPr>
-      <p:sp>
-        <p:nvSpPr>
-          <p:cNvPr id="2" name="Título 1"/>
-          <p:cNvSpPr>
-            <a:spLocks noGrp="1"/>
-          </p:cNvSpPr>
-          <p:nvPr>
-            <p:ph type="title"/>
-          </p:nvPr>
-        </p:nvSpPr>
-        <p:spPr/>
-        <p:txBody>
-          <a:bodyPr/>
-          <a:lstStyle/>
-          <a:p>
-            <a:endParaRPr lang="es-MX"/>
-          </a:p>
-        </p:txBody>
-      </p:sp>
-      <p:sp>
-        <p:nvSpPr>
-          <p:cNvPr id="3" name="Marcador de contenido 2"/>
-          <p:cNvSpPr>
-            <a:spLocks noGrp="1"/>
-          </p:cNvSpPr>
-          <p:nvPr>
-            <p:ph idx="1"/>
-          </p:nvPr>
-        </p:nvSpPr>
-        <p:spPr/>
-        <p:txBody>
-          <a:bodyPr/>
-          <a:lstStyle/>
-          <a:p>
-            <a:endParaRPr lang="es-MX"/>
-          </a:p>
-        </p:txBody>
-      </p:sp>
-    </p:spTree>
-    <p:extLst>
-      <p:ext uri="{BB962C8B-B14F-4D97-AF65-F5344CB8AC3E}">
-        <p14:creationId xmlns:p14="http://schemas.microsoft.com/office/powerpoint/2010/main" val="3076150737"/>
-      </p:ext>
-    </p:extLst>
-  </p:cSld>
-  <p:clrMapOvr>
-    <a:masterClrMapping/>
-  </p:clrMapOvr>
-</p:sld>
-</file>
-
-<file path=ppt/slides/slide11.xml><?xml version="1.0" encoding="utf-8"?>
-<p:sld xmlns:a="http://schemas.openxmlformats.org/drawingml/2006/main" xmlns:r="http://schemas.openxmlformats.org/officeDocument/2006/relationships" xmlns:p="http://schemas.openxmlformats.org/presentationml/2006/main">
-  <p:cSld>
-    <p:spTree>
-      <p:nvGrpSpPr>
-        <p:cNvPr id="1" name=""/>
-        <p:cNvGrpSpPr/>
-        <p:nvPr/>
-      </p:nvGrpSpPr>
-      <p:grpSpPr>
-        <a:xfrm>
-          <a:off x="0" y="0"/>
-          <a:ext cx="0" cy="0"/>
-          <a:chOff x="0" y="0"/>
-          <a:chExt cx="0" cy="0"/>
-        </a:xfrm>
-      </p:grpSpPr>
-      <p:sp>
-        <p:nvSpPr>
-          <p:cNvPr id="2" name="Título 1"/>
-          <p:cNvSpPr>
-            <a:spLocks noGrp="1"/>
-          </p:cNvSpPr>
-          <p:nvPr>
-            <p:ph type="title"/>
-          </p:nvPr>
-        </p:nvSpPr>
-        <p:spPr/>
-        <p:txBody>
-          <a:bodyPr/>
-          <a:lstStyle/>
-          <a:p>
-            <a:endParaRPr lang="es-MX"/>
-          </a:p>
-        </p:txBody>
-      </p:sp>
-      <p:sp>
-        <p:nvSpPr>
-          <p:cNvPr id="3" name="Marcador de contenido 2"/>
-          <p:cNvSpPr>
-            <a:spLocks noGrp="1"/>
-          </p:cNvSpPr>
-          <p:nvPr>
-            <p:ph idx="1"/>
-          </p:nvPr>
-        </p:nvSpPr>
-        <p:spPr/>
-        <p:txBody>
-          <a:bodyPr/>
-          <a:lstStyle/>
-          <a:p>
-            <a:endParaRPr lang="es-MX"/>
-          </a:p>
-        </p:txBody>
-      </p:sp>
-    </p:spTree>
-    <p:extLst>
-      <p:ext uri="{BB962C8B-B14F-4D97-AF65-F5344CB8AC3E}">
-        <p14:creationId xmlns:p14="http://schemas.microsoft.com/office/powerpoint/2010/main" val="1604890095"/>
-      </p:ext>
-    </p:extLst>
-  </p:cSld>
-  <p:clrMapOvr>
-    <a:masterClrMapping/>
-  </p:clrMapOvr>
-</p:sld>
-</file>
-
-<file path=ppt/slides/slide12.xml><?xml version="1.0" encoding="utf-8"?>
-<p:sld xmlns:a="http://schemas.openxmlformats.org/drawingml/2006/main" xmlns:r="http://schemas.openxmlformats.org/officeDocument/2006/relationships" xmlns:p="http://schemas.openxmlformats.org/presentationml/2006/main">
-  <p:cSld>
-    <p:spTree>
-      <p:nvGrpSpPr>
-        <p:cNvPr id="1" name=""/>
-        <p:cNvGrpSpPr/>
-        <p:nvPr/>
-      </p:nvGrpSpPr>
-      <p:grpSpPr>
-        <a:xfrm>
-          <a:off x="0" y="0"/>
-          <a:ext cx="0" cy="0"/>
-          <a:chOff x="0" y="0"/>
-          <a:chExt cx="0" cy="0"/>
-        </a:xfrm>
-      </p:grpSpPr>
-      <p:sp>
-        <p:nvSpPr>
-          <p:cNvPr id="2" name="Título 1"/>
-          <p:cNvSpPr>
-            <a:spLocks noGrp="1"/>
-          </p:cNvSpPr>
-          <p:nvPr>
-            <p:ph type="title"/>
-          </p:nvPr>
-        </p:nvSpPr>
-        <p:spPr/>
-        <p:txBody>
-          <a:bodyPr/>
-          <a:lstStyle/>
-          <a:p>
-            <a:endParaRPr lang="es-MX"/>
-          </a:p>
-        </p:txBody>
-      </p:sp>
-      <p:sp>
-        <p:nvSpPr>
-          <p:cNvPr id="3" name="Marcador de contenido 2"/>
-          <p:cNvSpPr>
-            <a:spLocks noGrp="1"/>
-          </p:cNvSpPr>
-          <p:nvPr>
-            <p:ph idx="1"/>
-          </p:nvPr>
-        </p:nvSpPr>
-        <p:spPr/>
-        <p:txBody>
-          <a:bodyPr/>
-          <a:lstStyle/>
-          <a:p>
-            <a:endParaRPr lang="es-MX"/>
-          </a:p>
-        </p:txBody>
-      </p:sp>
-    </p:spTree>
-    <p:extLst>
-      <p:ext uri="{BB962C8B-B14F-4D97-AF65-F5344CB8AC3E}">
-        <p14:creationId xmlns:p14="http://schemas.microsoft.com/office/powerpoint/2010/main" val="204173831"/>
-      </p:ext>
-    </p:extLst>
-  </p:cSld>
-  <p:clrMapOvr>
-    <a:masterClrMapping/>
-  </p:clrMapOvr>
-</p:sld>
-</file>
-
 <file path=ppt/slides/slide2.xml><?xml version="1.0" encoding="utf-8"?>
 <p:sld xmlns:a="http://schemas.openxmlformats.org/drawingml/2006/main" xmlns:r="http://schemas.openxmlformats.org/officeDocument/2006/relationships" xmlns:p="http://schemas.openxmlformats.org/presentationml/2006/main">
   <p:cSld>
@@ -12703,12 +12499,14 @@
         </p:nvSpPr>
         <p:spPr>
           <a:xfrm>
-            <a:off x="1141412" y="2097088"/>
-            <a:ext cx="9905999" cy="1146855"/>
+            <a:off x="1049973" y="2856252"/>
+            <a:ext cx="5899466" cy="1146855"/>
           </a:xfrm>
         </p:spPr>
         <p:txBody>
-          <a:bodyPr/>
+          <a:bodyPr>
+            <a:normAutofit fontScale="92500" lnSpcReduction="20000"/>
+          </a:bodyPr>
           <a:lstStyle/>
           <a:p>
             <a:r>
@@ -12729,7 +12527,11 @@
             </a:r>
             <a:r>
               <a:rPr lang="es-es" dirty="0"/>
-              <a:t> (tasa de abandono de los clientes)</a:t>
+              <a:t> (tasa de abandono de los clientes</a:t>
+            </a:r>
+            <a:r>
+              <a:rPr lang="es-es" dirty="0" smtClean="0"/>
+              <a:t>). </a:t>
             </a:r>
             <a:endParaRPr lang="es-ar" dirty="0"/>
           </a:p>
@@ -12738,6 +12540,36 @@
           </a:p>
         </p:txBody>
       </p:sp>
+      <p:pic>
+        <p:nvPicPr>
+          <p:cNvPr id="4" name="Imagen 3"/>
+          <p:cNvPicPr>
+            <a:picLocks noChangeAspect="1"/>
+          </p:cNvPicPr>
+          <p:nvPr/>
+        </p:nvPicPr>
+        <p:blipFill>
+          <a:blip r:embed="rId2">
+            <a:extLst>
+              <a:ext uri="{28A0092B-C50C-407E-A947-70E740481C1C}">
+                <a14:useLocalDpi xmlns:a14="http://schemas.microsoft.com/office/drawing/2010/main" val="0"/>
+              </a:ext>
+            </a:extLst>
+          </a:blip>
+          <a:stretch>
+            <a:fillRect/>
+          </a:stretch>
+        </p:blipFill>
+        <p:spPr>
+          <a:xfrm>
+            <a:off x="7424330" y="2562528"/>
+            <a:ext cx="3740648" cy="1734301"/>
+          </a:xfrm>
+          <a:prstGeom prst="rect">
+            <a:avLst/>
+          </a:prstGeom>
+        </p:spPr>
+      </p:pic>
     </p:spTree>
     <p:extLst>
       <p:ext uri="{BB962C8B-B14F-4D97-AF65-F5344CB8AC3E}">
@@ -12784,8 +12616,8 @@
           <a:lstStyle/>
           <a:p>
             <a:r>
-              <a:rPr lang="es-MX" dirty="0" err="1" smtClean="0"/>
-              <a:t>situacion</a:t>
+              <a:rPr lang="es-MX" dirty="0" smtClean="0"/>
+              <a:t>situación</a:t>
             </a:r>
             <a:endParaRPr lang="es-MX" dirty="0"/>
           </a:p>
@@ -12801,7 +12633,12 @@
             <p:ph idx="1"/>
           </p:nvPr>
         </p:nvSpPr>
-        <p:spPr/>
+        <p:spPr>
+          <a:xfrm>
+            <a:off x="1141413" y="2981007"/>
+            <a:ext cx="9905999" cy="1747747"/>
+          </a:xfrm>
+        </p:spPr>
         <p:txBody>
           <a:bodyPr/>
           <a:lstStyle/>
@@ -12821,6 +12658,36 @@
           </a:p>
         </p:txBody>
       </p:sp>
+      <p:pic>
+        <p:nvPicPr>
+          <p:cNvPr id="4" name="Imagen 3"/>
+          <p:cNvPicPr>
+            <a:picLocks noChangeAspect="1"/>
+          </p:cNvPicPr>
+          <p:nvPr/>
+        </p:nvPicPr>
+        <p:blipFill>
+          <a:blip r:embed="rId2">
+            <a:extLst>
+              <a:ext uri="{28A0092B-C50C-407E-A947-70E740481C1C}">
+                <a14:useLocalDpi xmlns:a14="http://schemas.microsoft.com/office/drawing/2010/main" val="0"/>
+              </a:ext>
+            </a:extLst>
+          </a:blip>
+          <a:stretch>
+            <a:fillRect/>
+          </a:stretch>
+        </p:blipFill>
+        <p:spPr>
+          <a:xfrm>
+            <a:off x="7190014" y="749164"/>
+            <a:ext cx="3429000" cy="1933575"/>
+          </a:xfrm>
+          <a:prstGeom prst="rect">
+            <a:avLst/>
+          </a:prstGeom>
+        </p:spPr>
+      </p:pic>
     </p:spTree>
     <p:extLst>
       <p:ext uri="{BB962C8B-B14F-4D97-AF65-F5344CB8AC3E}">
@@ -12861,7 +12728,12 @@
             <p:ph type="title"/>
           </p:nvPr>
         </p:nvSpPr>
-        <p:spPr/>
+        <p:spPr>
+          <a:xfrm>
+            <a:off x="1402669" y="662270"/>
+            <a:ext cx="3169330" cy="1478570"/>
+          </a:xfrm>
+        </p:spPr>
         <p:txBody>
           <a:bodyPr/>
           <a:lstStyle/>
@@ -12884,9 +12756,16 @@
             <p:ph idx="1"/>
           </p:nvPr>
         </p:nvSpPr>
-        <p:spPr/>
+        <p:spPr>
+          <a:xfrm>
+            <a:off x="1402669" y="2491824"/>
+            <a:ext cx="5507581" cy="1852250"/>
+          </a:xfrm>
+        </p:spPr>
         <p:txBody>
-          <a:bodyPr/>
+          <a:bodyPr>
+            <a:normAutofit/>
+          </a:bodyPr>
           <a:lstStyle/>
           <a:p>
             <a:r>
@@ -12904,6 +12783,36 @@
           </a:p>
         </p:txBody>
       </p:sp>
+      <p:pic>
+        <p:nvPicPr>
+          <p:cNvPr id="4" name="Imagen 3"/>
+          <p:cNvPicPr>
+            <a:picLocks noChangeAspect="1"/>
+          </p:cNvPicPr>
+          <p:nvPr/>
+        </p:nvPicPr>
+        <p:blipFill>
+          <a:blip r:embed="rId2">
+            <a:extLst>
+              <a:ext uri="{28A0092B-C50C-407E-A947-70E740481C1C}">
+                <a14:useLocalDpi xmlns:a14="http://schemas.microsoft.com/office/drawing/2010/main" val="0"/>
+              </a:ext>
+            </a:extLst>
+          </a:blip>
+          <a:stretch>
+            <a:fillRect/>
+          </a:stretch>
+        </p:blipFill>
+        <p:spPr>
+          <a:xfrm>
+            <a:off x="7485018" y="2262794"/>
+            <a:ext cx="3701904" cy="2081280"/>
+          </a:xfrm>
+          <a:prstGeom prst="rect">
+            <a:avLst/>
+          </a:prstGeom>
+        </p:spPr>
+      </p:pic>
     </p:spTree>
     <p:extLst>
       <p:ext uri="{BB962C8B-B14F-4D97-AF65-F5344CB8AC3E}">
@@ -12944,7 +12853,12 @@
             <p:ph type="title"/>
           </p:nvPr>
         </p:nvSpPr>
-        <p:spPr/>
+        <p:spPr>
+          <a:xfrm>
+            <a:off x="1807619" y="484516"/>
+            <a:ext cx="2072050" cy="1478570"/>
+          </a:xfrm>
+        </p:spPr>
         <p:txBody>
           <a:bodyPr/>
           <a:lstStyle/>
@@ -12964,7 +12878,7 @@
             <a:picLocks noChangeAspect="1"/>
             <a:extLst>
               <a:ext uri="smNativeData">
-                <pr:smNativeData xmlns:pr="smNativeData" xmlns:p14="http://schemas.microsoft.com/office/powerpoint/2010/main" xmlns="" val="SMDATA_15_SgSuXhMAAAAlAAAAEQAAAC0AAAAAkAAAAEgAAACQAAAASAAAAAAAAAAAAAAAAAAAAAEAAABQAAAAAAAAAAAA4D8AAAAAAADgPwAAAAAAAOA/AAAAAAAA4D8AAAAAAADgPwAAAAAAAOA/AAAAAAAA4D8AAAAAAADgPwAAAAAAAOA/AAAAAAAA4D8CAAAAjAAAAAAAAAAAAAAAprcnDP///wgAAAAAAAAAAAAAAAAAAAAAAAAAAAAAAAAAAAAAZAAAAAEAAABAAAAAAAAAAAAAAAAAAAAAAAAAAAAAAAAAAAAAAAAAAAAAAAAAAAAAAAAAAAAAAAAAAAAAAAAAAAAAAAAAAAAAAAAAAAAAAAAAAAAAAAAAAAAAAAAAAAAAFAAAADwAAAAAAAAAAAAAAAAAAAkUAAAAAQAAABQAAAAUAAAAFAAAAAEAAAAAAAAAZAAAAGQAAAAAAAAAZAAAAGQAAAAVAAAAYAAAAAAAAAAAAAAADwAAACADAAAAAAAAAAAAAAEAAACgMgAAVgcAAKr4//8BAAAAf39/AAEAAABkAAAAAAAAABQAAABAHwAAAAAAACYAAAAAAAAAwOD//wAAAAAmAAAAZAAAABYAAABMAAAAAAAAAAAAAAAEAAAAAAAAAAEAAADd3d0KAAAAACgAAAAoAAAAZAAAAGQAAAAAAAAAzMzMAAAAAABQAAAAUAAAAGQAAABkAAAAAAAAAAcAAAA4AAAAAAAAAAAAAAAAAAAA////AAAAAAAAAAAAAAAAAAAAAAAAAAAAAAAAAAAAAABkAAAAZAAAAAAAAAAjAAAABAAAAGQAAAAXAAAAFAAAAAAAAAAAAAAA/38AAP9/AAAAAAAACQAAAAQAAAAAAAAADAAAABAAAAAAAAAAAAAAAAAAAAAAAAAAHgAAAGgAAAAAAAAAAAAAAAAAAAAAAAAAAAAAABAnAAAQJwAAAAAAAAAAAAAAAAAAAAAAAAAAAAAAAAAAAAAAAAAAAAAUAAAAAAAAAMDA/wAAAAAAZAAAADIAAAAAAAAAZAAAAAAAAAB/f38ACgAAAB8AAABUAAAAprcnBf///wEAAAAAAAAAAAAAAAAAAAAAAAAAAAAAAAAAAAAAAAAAAAAAAAJ/f38A3d3dA8zMzADAwP8Af39/AAAAAAAAAAAAAAAAAP///wAAAAAAIQAAABgAAAAUAAAAoQoAAPERAABJFwAAmR4AABAAAAAmAAAACAAAAP//////////"/>
+                <pr:smNativeData xmlns="" xmlns:p14="http://schemas.microsoft.com/office/powerpoint/2010/main" xmlns:pr="smNativeData" val="SMDATA_15_SgSuXhMAAAAlAAAAEQAAAC0AAAAAkAAAAEgAAACQAAAASAAAAAAAAAAAAAAAAAAAAAEAAABQAAAAAAAAAAAA4D8AAAAAAADgPwAAAAAAAOA/AAAAAAAA4D8AAAAAAADgPwAAAAAAAOA/AAAAAAAA4D8AAAAAAADgPwAAAAAAAOA/AAAAAAAA4D8CAAAAjAAAAAAAAAAAAAAAprcnDP///wgAAAAAAAAAAAAAAAAAAAAAAAAAAAAAAAAAAAAAZAAAAAEAAABAAAAAAAAAAAAAAAAAAAAAAAAAAAAAAAAAAAAAAAAAAAAAAAAAAAAAAAAAAAAAAAAAAAAAAAAAAAAAAAAAAAAAAAAAAAAAAAAAAAAAAAAAAAAAAAAAAAAAFAAAADwAAAAAAAAAAAAAAAAAAAkUAAAAAQAAABQAAAAUAAAAFAAAAAEAAAAAAAAAZAAAAGQAAAAAAAAAZAAAAGQAAAAVAAAAYAAAAAAAAAAAAAAADwAAACADAAAAAAAAAAAAAAEAAACgMgAAVgcAAKr4//8BAAAAf39/AAEAAABkAAAAAAAAABQAAABAHwAAAAAAACYAAAAAAAAAwOD//wAAAAAmAAAAZAAAABYAAABMAAAAAAAAAAAAAAAEAAAAAAAAAAEAAADd3d0KAAAAACgAAAAoAAAAZAAAAGQAAAAAAAAAzMzMAAAAAABQAAAAUAAAAGQAAABkAAAAAAAAAAcAAAA4AAAAAAAAAAAAAAAAAAAA////AAAAAAAAAAAAAAAAAAAAAAAAAAAAAAAAAAAAAABkAAAAZAAAAAAAAAAjAAAABAAAAGQAAAAXAAAAFAAAAAAAAAAAAAAA/38AAP9/AAAAAAAACQAAAAQAAAAAAAAADAAAABAAAAAAAAAAAAAAAAAAAAAAAAAAHgAAAGgAAAAAAAAAAAAAAAAAAAAAAAAAAAAAABAnAAAQJwAAAAAAAAAAAAAAAAAAAAAAAAAAAAAAAAAAAAAAAAAAAAAUAAAAAAAAAMDA/wAAAAAAZAAAADIAAAAAAAAAZAAAAAAAAAB/f38ACgAAAB8AAABUAAAAprcnBf///wEAAAAAAAAAAAAAAAAAAAAAAAAAAAAAAAAAAAAAAAAAAAAAAAJ/f38A3d3dA8zMzADAwP8Af39/AAAAAAAAAAAAAAAAAP///wAAAAAAIQAAABgAAAAUAAAAoQoAAPERAABJFwAAmR4AABAAAAAmAAAACAAAAP//////////"/>
               </a:ext>
             </a:extLst>
           </p:cNvPicPr>
@@ -12978,8 +12892,8 @@
         </p:blipFill>
         <p:spPr>
           <a:xfrm>
-            <a:off x="1740898" y="3034120"/>
-            <a:ext cx="2057400" cy="2057400"/>
+            <a:off x="4004732" y="2512199"/>
+            <a:ext cx="802399" cy="802399"/>
           </a:xfrm>
           <a:prstGeom prst="rect">
             <a:avLst/>
@@ -12998,7 +12912,7 @@
             <a:picLocks noChangeAspect="1"/>
             <a:extLst>
               <a:ext uri="smNativeData">
-                <pr:smNativeData xmlns:pr="smNativeData" xmlns:p14="http://schemas.microsoft.com/office/powerpoint/2010/main" xmlns="" val="SMDATA_15_SgSuXhMAAAAlAAAAEQAAAC0AAAAAkAAAAEgAAACQAAAASAAAAAAAAAAAAAAAAAAAAAEAAABQAAAAAAAAAAAA4D8AAAAAAADgPwAAAAAAAOA/AAAAAAAA4D8AAAAAAADgPwAAAAAAAOA/AAAAAAAA4D8AAAAAAADgPwAAAAAAAOA/AAAAAAAA4D8CAAAAjAAAAAAAAAAAAAAAprcnDP///wgAAAAAAAAAAAAAAAAAAAAAAAAAAAAAAAAAAAAAZAAAAAEAAABAAAAAAAAAAAAAAAAAAAAAAAAAAAAAAAAAAAAAAAAAAAAAAAAAAAAAAAAAAAAAAAAAAAAAAAAAAAAAAAAAAAAAAAAAAAAAAAAAAAAAAAAAAAAAAAAAAAAAFAAAADwAAAAAAAAAAAAAAAAAAAkUAAAAAQAAABQAAAAUAAAAFAAAAAEAAAAAAAAAZAAAAGQAAAAAAAAAZAAAAGQAAAAVAAAAYAAAAAAAAAAAAAAADwAAACADAAAAAAAAAAAAAAEAAACgMgAAVgcAAKr4//8BAAAAf39/AAEAAABkAAAAAAAAABQAAABAHwAAAAAAACYAAAAAAAAAwOD//wAAAAAmAAAAZAAAABYAAABMAAAAAAAAAAAAAAAEAAAAAAAAAAEAAADd3d0KAAAAACgAAAAoAAAAZAAAAGQAAAAAAAAAzMzMAAAAAABQAAAAUAAAAGQAAABkAAAAAAAAAAcAAAA4AAAAAAAAAAAAAAAAAAAA////AAAAAAAAAAAAAAAAAAAAAAAAAAAAAAAAAAAAAABkAAAAZAAAAAAAAAAjAAAABAAAAGQAAAAXAAAAFAAAAAAAAAAAAAAA/38AAP9/AAAAAAAACQAAAAQAAAAAAAAADAAAABAAAAAAAAAAAAAAAAAAAAAAAAAAHgAAAGgAAAAAAAAAAAAAAAAAAAAAAAAAAAAAABAnAAAQJwAAAAAAAAAAAAAAAAAAAAAAAAAAAAAAAAAAAAAAAAAAAAAUAAAAAAAAAMDA/wAAAAAAZAAAADIAAAAAAAAAZAAAAAAAAAB/f38ACgAAAB8AAABUAAAAprcnBf///wEAAAAAAAAAAAAAAAAAAAAAAAAAAAAAAAAAAAAAAAAAAAAAAAJ/f38A3d3dA8zMzADAwP8Af39/AAAAAAAAAAAAAAAAAP///wAAAAAAIQAAABgAAAAUAAAAfyAAAPERAAAnLQAAmR4AABAAAAAmAAAACAAAAP//////////"/>
+                <pr:smNativeData xmlns="" xmlns:p14="http://schemas.microsoft.com/office/powerpoint/2010/main" xmlns:pr="smNativeData" val="SMDATA_15_SgSuXhMAAAAlAAAAEQAAAC0AAAAAkAAAAEgAAACQAAAASAAAAAAAAAAAAAAAAAAAAAEAAABQAAAAAAAAAAAA4D8AAAAAAADgPwAAAAAAAOA/AAAAAAAA4D8AAAAAAADgPwAAAAAAAOA/AAAAAAAA4D8AAAAAAADgPwAAAAAAAOA/AAAAAAAA4D8CAAAAjAAAAAAAAAAAAAAAprcnDP///wgAAAAAAAAAAAAAAAAAAAAAAAAAAAAAAAAAAAAAZAAAAAEAAABAAAAAAAAAAAAAAAAAAAAAAAAAAAAAAAAAAAAAAAAAAAAAAAAAAAAAAAAAAAAAAAAAAAAAAAAAAAAAAAAAAAAAAAAAAAAAAAAAAAAAAAAAAAAAAAAAAAAAFAAAADwAAAAAAAAAAAAAAAAAAAkUAAAAAQAAABQAAAAUAAAAFAAAAAEAAAAAAAAAZAAAAGQAAAAAAAAAZAAAAGQAAAAVAAAAYAAAAAAAAAAAAAAADwAAACADAAAAAAAAAAAAAAEAAACgMgAAVgcAAKr4//8BAAAAf39/AAEAAABkAAAAAAAAABQAAABAHwAAAAAAACYAAAAAAAAAwOD//wAAAAAmAAAAZAAAABYAAABMAAAAAAAAAAAAAAAEAAAAAAAAAAEAAADd3d0KAAAAACgAAAAoAAAAZAAAAGQAAAAAAAAAzMzMAAAAAABQAAAAUAAAAGQAAABkAAAAAAAAAAcAAAA4AAAAAAAAAAAAAAAAAAAA////AAAAAAAAAAAAAAAAAAAAAAAAAAAAAAAAAAAAAABkAAAAZAAAAAAAAAAjAAAABAAAAGQAAAAXAAAAFAAAAAAAAAAAAAAA/38AAP9/AAAAAAAACQAAAAQAAAAAAAAADAAAABAAAAAAAAAAAAAAAAAAAAAAAAAAHgAAAGgAAAAAAAAAAAAAAAAAAAAAAAAAAAAAABAnAAAQJwAAAAAAAAAAAAAAAAAAAAAAAAAAAAAAAAAAAAAAAAAAAAAUAAAAAAAAAMDA/wAAAAAAZAAAADIAAAAAAAAAZAAAAAAAAAB/f38ACgAAAB8AAABUAAAAprcnBf///wEAAAAAAAAAAAAAAAAAAAAAAAAAAAAAAAAAAAAAAAAAAAAAAAJ/f38A3d3dA8zMzADAwP8Af39/AAAAAAAAAAAAAAAAAP///wAAAAAAIQAAABgAAAAUAAAAfyAAAPERAAAnLQAAmR4AABAAAAAmAAAACAAAAP//////////"/>
               </a:ext>
             </a:extLst>
           </p:cNvPicPr>
@@ -13012,8 +12926,8 @@
         </p:blipFill>
         <p:spPr>
           <a:xfrm>
-            <a:off x="7516314" y="3034120"/>
-            <a:ext cx="2057400" cy="2057400"/>
+            <a:off x="8235731" y="2512199"/>
+            <a:ext cx="777641" cy="777641"/>
           </a:xfrm>
           <a:prstGeom prst="rect">
             <a:avLst/>
@@ -13031,7 +12945,7 @@
           <p:cNvSpPr>
             <a:extLst>
               <a:ext uri="smNativeData">
-                <pr:smNativeData xmlns:pr="smNativeData" xmlns:p14="http://schemas.microsoft.com/office/powerpoint/2010/main" xmlns="" val="SMDATA_13_SgSuXhMAAAAlAAAAZAAAAE0AAAAAkAAAAEgAAACQAAAASAAAAAAAAAAAAAAAAAAAAAEAAABQAAAAAAAAAAAA4D8AAAAAAADgPwAAAAAAAOA/AAAAAAAA4D8AAAAAAADgPwAAAAAAAOA/AAAAAAAA4D8AAAAAAADgPwAAAAAAAOA/AAAAAAAA4D8CAAAAjAAAAAAAAAAAAAAAprcnDP///wgAAAAAAAAAAAAAAAAAAAAAAAAAAAAAAAAAAAAAZAAAAAEAAABAAAAAAAAAAAAAAAAAAAAAAAAAAAAAAAAAAAAAAAAAAAAAAAAAAAAAAAAAAAAAAAAAAAAAAAAAAAAAAAAAAAAAAAAAAAAAAAAAAAAAAAAAAAAAAAAAAAAAFAAAADwAAAAAAAAAAAAAAAAAAAAPAAAAAQAAACMAAAAjAAAAIwAAAB4AAAAAAAAAZAAAAGQAAAAAAAAAZAAAAGQAAAAVAAAAYAAAAAAAAAAAAAAADwAAACADAAAAAAAAAAAAAAEAAACgMgAAVgcAAKr4//8BAAAAf39/AAEAAABkAAAAAAAAABQAAABAHwAAAAAAACYAAAAAAAAAwOD//wAAAAAmAAAAZAAAABYAAABMAAAAAAAAAAAAAAAEAAAAAAAAAAEAAADd3d0KAAAAACgAAAAoAAAAZAAAAGQAAAAAAAAAzMzMAAAAAABQAAAAUAAAAGQAAABkAAAAAAAAABcAAAAUAAAAAAAAAAAAAAD/fwAA/38AAAAAAAAJAAAABAAAAP7+/v4MAAAAEAAAAAAAAAAAAAAAAAAAAAAAAAAeAAAAaAAAAAAAAAAAAAAAAAAAAAAAAAAAAAAAECcAABAnAAAAAAAAAAAAAAAAAAAAAAAAAAAAAAAAAAAAAAAAAAAAABQAAAAAAAAAwMD/AAAAAABkAAAAMgAAAAAAAABkAAAAAAAAAH9/fwAKAAAAHwAAAFQAAACmtycF////AQAAAAAAAAAAAAAAAAAAAAAAAAAAAAAAAAAAAAAAAAAAAAAAAH9/fwDd3d0DzMzMAMDA/wB/f38AAAAAAAAAAAAAAAAAAAAAAAAAAAAhAAAAGAAAABQAAADICQAAVA0AAIQZAADiDwAAECAAACYAAAAIAAAA//////////8="/>
+                <pr:smNativeData xmlns="" xmlns:p14="http://schemas.microsoft.com/office/powerpoint/2010/main" xmlns:pr="smNativeData" val="SMDATA_13_SgSuXhMAAAAlAAAAZAAAAE0AAAAAkAAAAEgAAACQAAAASAAAAAAAAAAAAAAAAAAAAAEAAABQAAAAAAAAAAAA4D8AAAAAAADgPwAAAAAAAOA/AAAAAAAA4D8AAAAAAADgPwAAAAAAAOA/AAAAAAAA4D8AAAAAAADgPwAAAAAAAOA/AAAAAAAA4D8CAAAAjAAAAAAAAAAAAAAAprcnDP///wgAAAAAAAAAAAAAAAAAAAAAAAAAAAAAAAAAAAAAZAAAAAEAAABAAAAAAAAAAAAAAAAAAAAAAAAAAAAAAAAAAAAAAAAAAAAAAAAAAAAAAAAAAAAAAAAAAAAAAAAAAAAAAAAAAAAAAAAAAAAAAAAAAAAAAAAAAAAAAAAAAAAAFAAAADwAAAAAAAAAAAAAAAAAAAAPAAAAAQAAACMAAAAjAAAAIwAAAB4AAAAAAAAAZAAAAGQAAAAAAAAAZAAAAGQAAAAVAAAAYAAAAAAAAAAAAAAADwAAACADAAAAAAAAAAAAAAEAAACgMgAAVgcAAKr4//8BAAAAf39/AAEAAABkAAAAAAAAABQAAABAHwAAAAAAACYAAAAAAAAAwOD//wAAAAAmAAAAZAAAABYAAABMAAAAAAAAAAAAAAAEAAAAAAAAAAEAAADd3d0KAAAAACgAAAAoAAAAZAAAAGQAAAAAAAAAzMzMAAAAAABQAAAAUAAAAGQAAABkAAAAAAAAABcAAAAUAAAAAAAAAAAAAAD/fwAA/38AAAAAAAAJAAAABAAAAP7+/v4MAAAAEAAAAAAAAAAAAAAAAAAAAAAAAAAeAAAAaAAAAAAAAAAAAAAAAAAAAAAAAAAAAAAAECcAABAnAAAAAAAAAAAAAAAAAAAAAAAAAAAAAAAAAAAAAAAAAAAAABQAAAAAAAAAwMD/AAAAAABkAAAAMgAAAAAAAABkAAAAAAAAAH9/fwAKAAAAHwAAAFQAAACmtycF////AQAAAAAAAAAAAAAAAAAAAAAAAAAAAAAAAAAAAAAAAAAAAAAAAH9/fwDd3d0DzMzMAMDA/wB/f38AAAAAAAAAAAAAAAAAAAAAAAAAAAAhAAAAGAAAABQAAADICQAAVA0AAIQZAADiDwAAECAAACYAAAAIAAAA//////////8="/>
               </a:ext>
             </a:extLst>
           </p:cNvSpPr>
@@ -13039,7 +12953,7 @@
         </p:nvSpPr>
         <p:spPr>
           <a:xfrm>
-            <a:off x="1740898" y="2249646"/>
+            <a:off x="3357155" y="1746436"/>
             <a:ext cx="2557780" cy="415290"/>
           </a:xfrm>
           <a:prstGeom prst="rect">
@@ -13072,7 +12986,7 @@
           <p:cNvSpPr>
             <a:extLst>
               <a:ext uri="smNativeData">
-                <pr:smNativeData xmlns:pr="smNativeData" xmlns:p14="http://schemas.microsoft.com/office/powerpoint/2010/main" xmlns="" val="SMDATA_13_SgSuXhMAAAAlAAAAZAAAAE0AAAAAkAAAAEgAAACQAAAASAAAAAAAAAAAAAAAAAAAAAEAAABQAAAAAAAAAAAA4D8AAAAAAADgPwAAAAAAAOA/AAAAAAAA4D8AAAAAAADgPwAAAAAAAOA/AAAAAAAA4D8AAAAAAADgPwAAAAAAAOA/AAAAAAAA4D8CAAAAjAAAAAAAAAAAAAAAprcnDP///wgAAAAAAAAAAAAAAAAAAAAAAAAAAAAAAAAAAAAAZAAAAAEAAABAAAAAAAAAAAAAAAAAAAAAAAAAAAAAAAAAAAAAAAAAAAAAAAAAAAAAAAAAAAAAAAAAAAAAAAAAAAAAAAAAAAAAAAAAAAAAAAAAAAAAAAAAAAAAAAAAAAAAFAAAADwAAAAAAAAAAAAAAAAAAAAPAAAAAQAAACMAAAAjAAAAIwAAAB4AAAAAAAAAZAAAAGQAAAAAAAAAZAAAAGQAAAAVAAAAYAAAAAAAAAAAAAAADwAAACADAAAAAAAAAAAAAAEAAACgMgAAVgcAAKr4//8BAAAAf39/AAEAAABkAAAAAAAAABQAAABAHwAAAAAAACYAAAAAAAAAwOD//wAAAAAmAAAAZAAAABYAAABMAAAAAAAAAAAAAAAEAAAAAAAAAAEAAADd3d0KAAAAACgAAAAoAAAAZAAAAGQAAAAAAAAAzMzMAAAAAABQAAAAUAAAAGQAAABkAAAAAAAAABcAAAAUAAAAAAAAAAAAAAD/fwAA/38AAAAAAAAJAAAABAAAAP////8MAAAAEAAAAAAAAAAAAAAAAAAAAAAAAAAeAAAAaAAAAAAAAAAAAAAAAAAAAAAAAAAAAAAAECcAABAnAAAAAAAAAAAAAAAAAAAAAAAAAAAAAAAAAAAAAAAAAAAAABQAAAAAAAAAwMD/AAAAAABkAAAAMgAAAAAAAABkAAAAAAAAAH9/fwAKAAAAHwAAAFQAAACmtycF////AQAAAAAAAAAAAAAAAAAAAAAAAAAAAAAAAAAAAAAAAAAAAAAAAH9/fwDd3d0DzMzMAMDA/wB/f38AAAAAAAAAAAAAAAAAAAAAAAAAAAAhAAAAGAAAABQAAADnHAAAVA0AAKc0AADiDwAAECAAACYAAAAIAAAA//////////8="/>
+                <pr:smNativeData xmlns="" xmlns:p14="http://schemas.microsoft.com/office/powerpoint/2010/main" xmlns:pr="smNativeData" val="SMDATA_13_SgSuXhMAAAAlAAAAZAAAAE0AAAAAkAAAAEgAAACQAAAASAAAAAAAAAAAAAAAAAAAAAEAAABQAAAAAAAAAAAA4D8AAAAAAADgPwAAAAAAAOA/AAAAAAAA4D8AAAAAAADgPwAAAAAAAOA/AAAAAAAA4D8AAAAAAADgPwAAAAAAAOA/AAAAAAAA4D8CAAAAjAAAAAAAAAAAAAAAprcnDP///wgAAAAAAAAAAAAAAAAAAAAAAAAAAAAAAAAAAAAAZAAAAAEAAABAAAAAAAAAAAAAAAAAAAAAAAAAAAAAAAAAAAAAAAAAAAAAAAAAAAAAAAAAAAAAAAAAAAAAAAAAAAAAAAAAAAAAAAAAAAAAAAAAAAAAAAAAAAAAAAAAAAAAFAAAADwAAAAAAAAAAAAAAAAAAAAPAAAAAQAAACMAAAAjAAAAIwAAAB4AAAAAAAAAZAAAAGQAAAAAAAAAZAAAAGQAAAAVAAAAYAAAAAAAAAAAAAAADwAAACADAAAAAAAAAAAAAAEAAACgMgAAVgcAAKr4//8BAAAAf39/AAEAAABkAAAAAAAAABQAAABAHwAAAAAAACYAAAAAAAAAwOD//wAAAAAmAAAAZAAAABYAAABMAAAAAAAAAAAAAAAEAAAAAAAAAAEAAADd3d0KAAAAACgAAAAoAAAAZAAAAGQAAAAAAAAAzMzMAAAAAABQAAAAUAAAAGQAAABkAAAAAAAAABcAAAAUAAAAAAAAAAAAAAD/fwAA/38AAAAAAAAJAAAABAAAAP////8MAAAAEAAAAAAAAAAAAAAAAAAAAAAAAAAeAAAAaAAAAAAAAAAAAAAAAAAAAAAAAAAAAAAAECcAABAnAAAAAAAAAAAAAAAAAAAAAAAAAAAAAAAAAAAAAAAAAAAAABQAAAAAAAAAwMD/AAAAAABkAAAAMgAAAAAAAABkAAAAAAAAAH9/fwAKAAAAHwAAAFQAAACmtycF////AQAAAAAAAAAAAAAAAAAAAAAAAAAAAAAAAAAAAAAAAAAAAAAAAH9/fwDd3d0DzMzMAMDA/wB/f38AAAAAAAAAAAAAAAAAAAAAAAAAAAAhAAAAGAAAABQAAADnHAAAVA0AAKc0AADiDwAAECAAACYAAAAIAAAA//////////8="/>
               </a:ext>
             </a:extLst>
           </p:cNvSpPr>
@@ -13080,8 +12994,8 @@
         </p:nvSpPr>
         <p:spPr>
           <a:xfrm>
-            <a:off x="6879862" y="2204425"/>
-            <a:ext cx="3860800" cy="415290"/>
+            <a:off x="6678136" y="1746436"/>
+            <a:ext cx="3338059" cy="415290"/>
           </a:xfrm>
           <a:prstGeom prst="rect">
             <a:avLst/>
@@ -13107,6 +13021,30 @@
           </a:p>
         </p:txBody>
       </p:sp>
+      <p:pic>
+        <p:nvPicPr>
+          <p:cNvPr id="3" name="Imagen 2"/>
+          <p:cNvPicPr>
+            <a:picLocks noChangeAspect="1"/>
+          </p:cNvPicPr>
+          <p:nvPr/>
+        </p:nvPicPr>
+        <p:blipFill>
+          <a:blip r:embed="rId3"/>
+          <a:stretch>
+            <a:fillRect/>
+          </a:stretch>
+        </p:blipFill>
+        <p:spPr>
+          <a:xfrm>
+            <a:off x="1294446" y="3640313"/>
+            <a:ext cx="8558205" cy="1831285"/>
+          </a:xfrm>
+          <a:prstGeom prst="rect">
+            <a:avLst/>
+          </a:prstGeom>
+        </p:spPr>
+      </p:pic>
     </p:spTree>
     <p:extLst>
       <p:ext uri="{BB962C8B-B14F-4D97-AF65-F5344CB8AC3E}">
@@ -13147,7 +13085,12 @@
             <p:ph type="title"/>
           </p:nvPr>
         </p:nvSpPr>
-        <p:spPr/>
+        <p:spPr>
+          <a:xfrm>
+            <a:off x="1285103" y="122130"/>
+            <a:ext cx="4553993" cy="1478570"/>
+          </a:xfrm>
+        </p:spPr>
         <p:txBody>
           <a:bodyPr/>
           <a:lstStyle/>
@@ -13167,7 +13110,7 @@
             <a:spLocks noGrp="1"/>
             <a:extLst>
               <a:ext uri="smNativeData">
-                <pr:smNativeData xmlns:pr="smNativeData" xmlns:p14="http://schemas.microsoft.com/office/powerpoint/2010/main" xmlns="" val="SMDATA_13_SgSuXhMAAAAlAAAAZAAAAE0AAAAAkAAAAEgAAACQAAAASAAAAAAAAAAAAAAAAAAAAAEAAABQAAAAAAAAAAAA4D8AAAAAAADgPwAAAAAAAOA/AAAAAAAA4D8AAAAAAADgPwAAAAAAAOA/AAAAAAAA4D8AAAAAAADgPwAAAAAAAOA/AAAAAAAA4D8CAAAAjAAAAAAAAAAAAAAAprcnDP///wgAAAAAAAAAAAAAAAAAAAAAAAAAAAAAAAAAAAAAZAAAAAEAAABAAAAAAAAAAAAAAAAAAAAAAAAAAAAAAAAAAAAAAAAAAAAAAAAAAAAAAAAAAAAAAAAAAAAAAAAAAAAAAAAAAAAAAAAAAAAAAAAAAAAAAAAAAAAAAAAAAAAAFAAAADwAAAAAAAAAAAAAAAAAAAAPAAAAAQAAACMAAAAjAAAAIwAAAB4AAAAAAAAAZAAAAGQAAAAAAAAAZAAAAGQAAAAVAAAAYAAAAAAAAAAAAAAADwAAACADAAAAAAAAAAAAAAEAAACgMgAAVgcAAKr4//8BAAAAf39/AAEAAABkAAAAAAAAABQAAABAHwAAAAAAACYAAAAAAAAAwOD//wAAAAAmAAAAZAAAABYAAABMAAAAAAAAAAAAAAAEAAAAAAAAAAEAAADd3d0KAAAAACgAAAAoAAAAZAAAAGQAAAAAAAAAzMzMAAAAAABQAAAAUAAAAGQAAABkAAAAAAAAABcAAAAUAAAAAAAAAAAAAAD/fwAA/38AAAAAAAAJAAAABAAAAAAAAAAMAAAAEAAAAAAAAAAAAAAAAAAAAAAAAAAeAAAAaAAAAAAAAAAAAAAAAAAAAAAAAAAAAAAAECcAABAnAAAAAAAAAAAAAAAAAAAAAAAAAAAAAAAAAAAAAAAAAAAAABQAAAAAAAAAwMD/AAAAAABkAAAAMgAAAAAAAABkAAAAAAAAAH9/fwAKAAAAHwAAAFQAAACmtycF////AQAAAAAAAAAAAAAAAAAAAAAAAAAAAAAAAAAAAAAAAAAAAAAAAH9/fwDd3d0DzMzMAMDA/wB/f38AAAAAAAAAAAAAAAAAAAAAAAAAAAAhAAAAGAAAABQAAADnBAAAEAgAAHQkAABwKAAAECAAACYAAAAIAAAA//////////8="/>
+                <pr:smNativeData xmlns="" xmlns:p14="http://schemas.microsoft.com/office/powerpoint/2010/main" xmlns:pr="smNativeData" val="SMDATA_13_SgSuXhMAAAAlAAAAZAAAAE0AAAAAkAAAAEgAAACQAAAASAAAAAAAAAAAAAAAAAAAAAEAAABQAAAAAAAAAAAA4D8AAAAAAADgPwAAAAAAAOA/AAAAAAAA4D8AAAAAAADgPwAAAAAAAOA/AAAAAAAA4D8AAAAAAADgPwAAAAAAAOA/AAAAAAAA4D8CAAAAjAAAAAAAAAAAAAAAprcnDP///wgAAAAAAAAAAAAAAAAAAAAAAAAAAAAAAAAAAAAAZAAAAAEAAABAAAAAAAAAAAAAAAAAAAAAAAAAAAAAAAAAAAAAAAAAAAAAAAAAAAAAAAAAAAAAAAAAAAAAAAAAAAAAAAAAAAAAAAAAAAAAAAAAAAAAAAAAAAAAAAAAAAAAFAAAADwAAAAAAAAAAAAAAAAAAAAPAAAAAQAAACMAAAAjAAAAIwAAAB4AAAAAAAAAZAAAAGQAAAAAAAAAZAAAAGQAAAAVAAAAYAAAAAAAAAAAAAAADwAAACADAAAAAAAAAAAAAAEAAACgMgAAVgcAAKr4//8BAAAAf39/AAEAAABkAAAAAAAAABQAAABAHwAAAAAAACYAAAAAAAAAwOD//wAAAAAmAAAAZAAAABYAAABMAAAAAAAAAAAAAAAEAAAAAAAAAAEAAADd3d0KAAAAACgAAAAoAAAAZAAAAGQAAAAAAAAAzMzMAAAAAABQAAAAUAAAAGQAAABkAAAAAAAAABcAAAAUAAAAAAAAAAAAAAD/fwAA/38AAAAAAAAJAAAABAAAAAAAAAAMAAAAEAAAAAAAAAAAAAAAAAAAAAAAAAAeAAAAaAAAAAAAAAAAAAAAAAAAAAAAAAAAAAAAECcAABAnAAAAAAAAAAAAAAAAAAAAAAAAAAAAAAAAAAAAAAAAAAAAABQAAAAAAAAAwMD/AAAAAABkAAAAMgAAAAAAAABkAAAAAAAAAH9/fwAKAAAAHwAAAFQAAACmtycF////AQAAAAAAAAAAAAAAAAAAAAAAAAAAAAAAAAAAAAAAAAAAAAAAAH9/fwDd3d0DzMzMAMDA/wB/f38AAAAAAAAAAAAAAAAAAAAAAAAAAAAhAAAAGAAAABQAAADnBAAAEAgAAHQkAABwKAAAECAAACYAAAAIAAAA//////////8="/>
               </a:ext>
             </a:extLst>
           </p:cNvSpPr>
@@ -13177,8 +13120,8 @@
         </p:nvSpPr>
         <p:spPr>
           <a:xfrm>
-            <a:off x="1141412" y="1737361"/>
-            <a:ext cx="4162108" cy="4833256"/>
+            <a:off x="2055813" y="1600700"/>
+            <a:ext cx="7258005" cy="4833256"/>
           </a:xfrm>
           <a:prstGeom prst="rect">
             <a:avLst/>
@@ -13337,7 +13280,7 @@
         </p:nvSpPr>
         <p:spPr>
           <a:xfrm>
-            <a:off x="7785463" y="1737361"/>
+            <a:off x="7027818" y="538249"/>
             <a:ext cx="2286000" cy="646331"/>
           </a:xfrm>
           <a:prstGeom prst="rect">
@@ -13529,7 +13472,7 @@
           <p:cNvSpPr>
             <a:extLst>
               <a:ext uri="smNativeData">
-                <pr:smNativeData xmlns:pr="smNativeData" xmlns:p14="http://schemas.microsoft.com/office/powerpoint/2010/main" xmlns="" val="SMDATA_13_SgSuXhMAAAAlAAAAZAAAAE0AAAAAkAAAAEgAAACQAAAASAAAAAAAAAAAAAAAAAAAAAEAAABQAAAAAAAAAAAA4D8AAAAAAADgPwAAAAAAAOA/AAAAAAAA4D8AAAAAAADgPwAAAAAAAOA/AAAAAAAA4D8AAAAAAADgPwAAAAAAAOA/AAAAAAAA4D8CAAAAjAAAAAAAAAAAAAAAprcnDP///wgAAAAAAAAAAAAAAAAAAAAAAAAAAAAAAAAAAAAAZAAAAAEAAABAAAAAAAAAAAAAAAAAAAAAAAAAAAAAAAAAAAAAAAAAAAAAAAAAAAAAAAAAAAAAAAAAAAAAAAAAAAAAAAAAAAAAAAAAAAAAAAAAAAAAAAAAAAAAAAAAAAAAFAAAADwAAAAAAAAAAAAAAAAAAAAPAAAAAQAAACMAAAAjAAAAIwAAAB4AAAAAAAAAZAAAAGQAAAAAAAAAZAAAAGQAAAAVAAAAYAAAAAAAAAAAAAAADwAAACADAAAAAAAAAAAAAAEAAACgMgAAVgcAAKr4//8BAAAAf39/AAEAAABkAAAAAAAAABQAAABAHwAAAAAAACYAAAAAAAAAwOD//wAAAAAmAAAAZAAAABYAAABMAAAAAAAAAAAAAAAEAAAAAAAAAAEAAADd3d0KAAAAACgAAAAoAAAAZAAAAGQAAAAAAAAAzMzMAAAAAABQAAAAUAAAAGQAAABkAAAAAAAAABcAAAAUAAAAAAAAAAAAAAD/fwAA/38AAAAAAAAJAAAABAAAAAYAAAAMAAAAEAAAAAAAAAAAAAAAAAAAAAAAAAAeAAAAaAAAAAAAAAAAAAAAAAAAAAAAAAAAAAAAECcAABAnAAAAAAAAAAAAAAAAAAAAAAAAAAAAAAAAAAAAAAAAAAAAABQAAAAAAAAAwMD/AAAAAABkAAAAMgAAAAAAAABkAAAAAAAAAH9/fwAKAAAAHwAAAFQAAACmtycF////AQAAAAAAAAAAAAAAAAAAAAAAAAAAAAAAAAAAAAAAAAAAAAAAAH9/fwDd3d0DzMzMAMDA/wB/f38AAAAAAAAAAAAAAAAAAAAAAAAAAAAhAAAAGAAAABQAAADnBAAAXAkAAHQkAABsKQAAACAAACYAAAAIAAAA//////////8="/>
+                <pr:smNativeData xmlns="" xmlns:p14="http://schemas.microsoft.com/office/powerpoint/2010/main" xmlns:pr="smNativeData" val="SMDATA_13_SgSuXhMAAAAlAAAAZAAAAE0AAAAAkAAAAEgAAACQAAAASAAAAAAAAAAAAAAAAAAAAAEAAABQAAAAAAAAAAAA4D8AAAAAAADgPwAAAAAAAOA/AAAAAAAA4D8AAAAAAADgPwAAAAAAAOA/AAAAAAAA4D8AAAAAAADgPwAAAAAAAOA/AAAAAAAA4D8CAAAAjAAAAAAAAAAAAAAAprcnDP///wgAAAAAAAAAAAAAAAAAAAAAAAAAAAAAAAAAAAAAZAAAAAEAAABAAAAAAAAAAAAAAAAAAAAAAAAAAAAAAAAAAAAAAAAAAAAAAAAAAAAAAAAAAAAAAAAAAAAAAAAAAAAAAAAAAAAAAAAAAAAAAAAAAAAAAAAAAAAAAAAAAAAAFAAAADwAAAAAAAAAAAAAAAAAAAAPAAAAAQAAACMAAAAjAAAAIwAAAB4AAAAAAAAAZAAAAGQAAAAAAAAAZAAAAGQAAAAVAAAAYAAAAAAAAAAAAAAADwAAACADAAAAAAAAAAAAAAEAAACgMgAAVgcAAKr4//8BAAAAf39/AAEAAABkAAAAAAAAABQAAABAHwAAAAAAACYAAAAAAAAAwOD//wAAAAAmAAAAZAAAABYAAABMAAAAAAAAAAAAAAAEAAAAAAAAAAEAAADd3d0KAAAAACgAAAAoAAAAZAAAAGQAAAAAAAAAzMzMAAAAAABQAAAAUAAAAGQAAABkAAAAAAAAABcAAAAUAAAAAAAAAAAAAAD/fwAA/38AAAAAAAAJAAAABAAAAAYAAAAMAAAAEAAAAAAAAAAAAAAAAAAAAAAAAAAeAAAAaAAAAAAAAAAAAAAAAAAAAAAAAAAAAAAAECcAABAnAAAAAAAAAAAAAAAAAAAAAAAAAAAAAAAAAAAAAAAAAAAAABQAAAAAAAAAwMD/AAAAAABkAAAAMgAAAAAAAABkAAAAAAAAAH9/fwAKAAAAHwAAAFQAAACmtycF////AQAAAAAAAAAAAAAAAAAAAAAAAAAAAAAAAAAAAAAAAAAAAAAAAH9/fwDd3d0DzMzMAMDA/wB/f38AAAAAAAAAAAAAAAAAAAAAAAAAAAAhAAAAGAAAABQAAADnBAAAXAkAAHQkAABsKQAAACAAACYAAAAIAAAA//////////8="/>
               </a:ext>
             </a:extLst>
           </p:cNvSpPr>
@@ -13538,7 +13481,7 @@
         <p:spPr>
           <a:xfrm>
             <a:off x="1005930" y="940526"/>
-            <a:ext cx="5721441" cy="5499463"/>
+            <a:ext cx="10306504" cy="5499463"/>
           </a:xfrm>
           <a:prstGeom prst="rect">
             <a:avLst/>
@@ -13574,22 +13517,13 @@
               <a:defRPr lang="es-es" sz="2100"/>
             </a:pPr>
             <a:r>
-              <a:rPr dirty="0"/>
+              <a:rPr u="sng" dirty="0"/>
               <a:t>En cuanto a nulos</a:t>
             </a:r>
             <a:r>
               <a:rPr dirty="0" smtClean="0"/>
               <a:t>:	</a:t>
             </a:r>
-            <a:endParaRPr dirty="0"/>
-          </a:p>
-          <a:p>
-            <a:pPr>
-              <a:lnSpc>
-                <a:spcPct val="200000"/>
-              </a:lnSpc>
-              <a:defRPr lang="es-es" sz="2100"/>
-            </a:pPr>
             <a:endParaRPr dirty="0"/>
           </a:p>
           <a:p>
@@ -13611,27 +13545,46 @@
               <a:defRPr lang="es-es" sz="2100"/>
             </a:pPr>
             <a:r>
-              <a:rPr dirty="0"/>
-              <a:t>En cuanto a incorrectos:</a:t>
-            </a:r>
-          </a:p>
-          <a:p>
-            <a:pPr>
-              <a:lnSpc>
-                <a:spcPct val="200000"/>
-              </a:lnSpc>
-              <a:defRPr lang="es-es" sz="2100"/>
-            </a:pPr>
-            <a:endParaRPr dirty="0"/>
-          </a:p>
-          <a:p>
-            <a:pPr>
-              <a:lnSpc>
-                <a:spcPct val="200000"/>
-              </a:lnSpc>
-              <a:defRPr lang="es-es" sz="2100"/>
-            </a:pPr>
-            <a:endParaRPr dirty="0"/>
+              <a:rPr u="sng" dirty="0"/>
+              <a:t>En cuanto a incorrectos</a:t>
+            </a:r>
+            <a:r>
+              <a:rPr dirty="0" smtClean="0"/>
+              <a:t>: </a:t>
+            </a:r>
+            <a:r>
+              <a:rPr sz="1600" dirty="0" smtClean="0"/>
+              <a:t>Se limpiaron datos sobre las cantidades semanales y acumulados mensuales de pack de datos, </a:t>
+            </a:r>
+            <a:r>
+              <a:rPr sz="1600" dirty="0" err="1" smtClean="0"/>
+              <a:t>sms</a:t>
+            </a:r>
+            <a:r>
+              <a:rPr sz="1600" dirty="0" smtClean="0"/>
+              <a:t> y voz. Estos datos eran incorrectos debido a una mala </a:t>
+            </a:r>
+            <a:r>
+              <a:rPr sz="1600" dirty="0" err="1" smtClean="0"/>
+              <a:t>recolecci</a:t>
+            </a:r>
+            <a:r>
+              <a:rPr lang="es-MX" sz="1600" dirty="0" err="1" smtClean="0"/>
+              <a:t>ó</a:t>
+            </a:r>
+            <a:r>
+              <a:rPr sz="1600" dirty="0" smtClean="0"/>
+              <a:t>n de los datos por parte del </a:t>
+            </a:r>
+            <a:r>
+              <a:rPr lang="es-MX" sz="1600" dirty="0" smtClean="0"/>
+              <a:t>á</a:t>
+            </a:r>
+            <a:r>
+              <a:rPr sz="1600" dirty="0" smtClean="0"/>
+              <a:t>rea de DB.</a:t>
+            </a:r>
+            <a:endParaRPr sz="1600" dirty="0"/>
           </a:p>
           <a:p>
             <a:pPr marL="342900" indent="-342900">
@@ -13643,374 +13596,51 @@
               <a:defRPr lang="es-es" sz="2100"/>
             </a:pPr>
             <a:r>
-              <a:rPr dirty="0"/>
+              <a:rPr u="sng" dirty="0"/>
               <a:t>En cuanto a </a:t>
             </a:r>
             <a:r>
-              <a:rPr dirty="0" err="1"/>
+              <a:rPr u="sng" dirty="0" err="1" smtClean="0"/>
               <a:t>outliers</a:t>
             </a:r>
-            <a:r>
-              <a:rPr dirty="0"/>
-              <a:t>...</a:t>
-            </a:r>
+            <a:endParaRPr u="sng" dirty="0"/>
           </a:p>
         </p:txBody>
       </p:sp>
+      <p:pic>
+        <p:nvPicPr>
+          <p:cNvPr id="3" name="Imagen 2"/>
+          <p:cNvPicPr>
+            <a:picLocks noChangeAspect="1"/>
+          </p:cNvPicPr>
+          <p:nvPr/>
+        </p:nvPicPr>
+        <p:blipFill>
+          <a:blip r:embed="rId2">
+            <a:extLst>
+              <a:ext uri="{28A0092B-C50C-407E-A947-70E740481C1C}">
+                <a14:useLocalDpi xmlns:a14="http://schemas.microsoft.com/office/drawing/2010/main" val="0"/>
+              </a:ext>
+            </a:extLst>
+          </a:blip>
+          <a:stretch>
+            <a:fillRect/>
+          </a:stretch>
+        </p:blipFill>
+        <p:spPr>
+          <a:xfrm>
+            <a:off x="7550331" y="409440"/>
+            <a:ext cx="2845934" cy="1539604"/>
+          </a:xfrm>
+          <a:prstGeom prst="rect">
+            <a:avLst/>
+          </a:prstGeom>
+        </p:spPr>
+      </p:pic>
     </p:spTree>
     <p:extLst>
       <p:ext uri="{BB962C8B-B14F-4D97-AF65-F5344CB8AC3E}">
         <p14:creationId xmlns:p14="http://schemas.microsoft.com/office/powerpoint/2010/main" val="2332238334"/>
-      </p:ext>
-    </p:extLst>
-  </p:cSld>
-  <p:clrMapOvr>
-    <a:masterClrMapping/>
-  </p:clrMapOvr>
-</p:sld>
-</file>
-
-<file path=ppt/slides/slide8.xml><?xml version="1.0" encoding="utf-8"?>
-<p:sld xmlns:a="http://schemas.openxmlformats.org/drawingml/2006/main" xmlns:r="http://schemas.openxmlformats.org/officeDocument/2006/relationships" xmlns:p="http://schemas.openxmlformats.org/presentationml/2006/main">
-  <p:cSld>
-    <p:spTree>
-      <p:nvGrpSpPr>
-        <p:cNvPr id="1" name=""/>
-        <p:cNvGrpSpPr/>
-        <p:nvPr/>
-      </p:nvGrpSpPr>
-      <p:grpSpPr>
-        <a:xfrm>
-          <a:off x="0" y="0"/>
-          <a:ext cx="0" cy="0"/>
-          <a:chOff x="0" y="0"/>
-          <a:chExt cx="0" cy="0"/>
-        </a:xfrm>
-      </p:grpSpPr>
-      <p:sp>
-        <p:nvSpPr>
-          <p:cNvPr id="2" name="Título 1"/>
-          <p:cNvSpPr>
-            <a:spLocks noGrp="1"/>
-          </p:cNvSpPr>
-          <p:nvPr>
-            <p:ph type="title"/>
-          </p:nvPr>
-        </p:nvSpPr>
-        <p:spPr>
-          <a:xfrm>
-            <a:off x="1376545" y="109067"/>
-            <a:ext cx="4684621" cy="713893"/>
-          </a:xfrm>
-        </p:spPr>
-        <p:txBody>
-          <a:bodyPr/>
-          <a:lstStyle/>
-          <a:p>
-            <a:r>
-              <a:rPr lang="es-MX" dirty="0" smtClean="0"/>
-              <a:t>Análisis de datos</a:t>
-            </a:r>
-            <a:endParaRPr lang="es-MX" dirty="0"/>
-          </a:p>
-        </p:txBody>
-      </p:sp>
-      <p:sp>
-        <p:nvSpPr>
-          <p:cNvPr id="5" name="CuadroTexto 5"/>
-          <p:cNvSpPr>
-            <a:extLst>
-              <a:ext uri="smNativeData">
-                <pr:smNativeData xmlns:pr="smNativeData" xmlns:p14="http://schemas.microsoft.com/office/powerpoint/2010/main" xmlns="" val="SMDATA_13_SgSuXhMAAAAlAAAAZAAAAE0AAAAAkAAAAEgAAACQAAAASAAAAAAAAAAAAAAAAAAAAAEAAABQAAAAAAAAAAAA4D8AAAAAAADgPwAAAAAAAOA/AAAAAAAA4D8AAAAAAADgPwAAAAAAAOA/AAAAAAAA4D8AAAAAAADgPwAAAAAAAOA/AAAAAAAA4D8CAAAAjAAAAAAAAAAAAAAAprcnDP///wgAAAAAAAAAAAAAAAAAAAAAAAAAAAAAAAAAAAAAZAAAAAEAAABAAAAAAAAAAAAAAAAAAAAAAAAAAAAAAAAAAAAAAAAAAAAAAAAAAAAAAAAAAAAAAAAAAAAAAAAAAAAAAAAAAAAAAAAAAAAAAAAAAAAAAAAAAAAAAAAAAAAAFAAAADwAAAAAAAAAAAAAAAAAAAAPAAAAAQAAACMAAAAjAAAAIwAAAB4AAAAAAAAAZAAAAGQAAAAAAAAAZAAAAGQAAAAVAAAAYAAAAAAAAAAAAAAADwAAACADAAAAAAAAAAAAAAEAAACgMgAAVgcAAKr4//8BAAAAf39/AAEAAABkAAAAAAAAABQAAABAHwAAAAAAACYAAAAAAAAAwOD//wAAAAAmAAAAZAAAABYAAABMAAAAAAAAAAAAAAAEAAAAAAAAAAEAAADd3d0KAAAAACgAAAAoAAAAZAAAAGQAAAAAAAAAzMzMAAAAAABQAAAAUAAAAGQAAABkAAAAAAAAABcAAAAUAAAAAAAAAAAAAAD/fwAA/38AAAAAAAAJAAAABAAAAAAAAAAMAAAAEAAAAAAAAAAAAAAAAAAAAAAAAAAeAAAAaAAAAAAAAAAAAAAAAAAAAAAAAAAAAAAAECcAABAnAAAAAAAAAAAAAAAAAAAAAAAAAAAAAAAAAAAAAAAAAAAAABQAAAAAAAAAwMD/AAAAAABkAAAAMgAAAAAAAABkAAAAAAAAAH9/fwAKAAAAHwAAAFQAAACmtycF////AQAAAAAAAAAAAAAAAAAAAAAAAAAAAAAAAAAAAAAAAAAAAAAAAH9/fwDd3d0DzMzMAMDA/wB/f38AAAAAAAAAAAAAAAAAAAAAAAAAAAAhAAAAGAAAABQAAADnBAAAXAkAAHQkAABODQAAECAAACYAAAAIAAAA//////////8="/>
-              </a:ext>
-            </a:extLst>
-          </p:cNvSpPr>
-          <p:nvPr/>
-        </p:nvSpPr>
-        <p:spPr>
-          <a:xfrm>
-            <a:off x="1376545" y="692332"/>
-            <a:ext cx="2124301" cy="613954"/>
-          </a:xfrm>
-          <a:prstGeom prst="rect">
-            <a:avLst/>
-          </a:prstGeom>
-          <a:noFill/>
-          <a:ln>
-            <a:noFill/>
-          </a:ln>
-          <a:effectLst/>
-        </p:spPr>
-        <p:txBody>
-          <a:bodyPr vert="horz" wrap="square" lIns="91440" tIns="45720" rIns="91440" bIns="45720" numCol="1" spcCol="215900" anchor="t"/>
-          <a:lstStyle/>
-          <a:p>
-            <a:pPr>
-              <a:lnSpc>
-                <a:spcPct val="200000"/>
-              </a:lnSpc>
-              <a:defRPr lang="en-us"/>
-            </a:pPr>
-            <a:r>
-              <a:rPr lang="es-es" sz="2100" u="sng" dirty="0" smtClean="0"/>
-              <a:t> </a:t>
-            </a:r>
-            <a:r>
-              <a:rPr lang="es-es" sz="2100" u="sng" dirty="0"/>
-              <a:t>Datos del cliente</a:t>
-            </a:r>
-          </a:p>
-        </p:txBody>
-      </p:sp>
-      <p:sp>
-        <p:nvSpPr>
-          <p:cNvPr id="7" name="Rectángulo1"/>
-          <p:cNvSpPr>
-            <a:extLst>
-              <a:ext uri="smNativeData">
-                <pr:smNativeData xmlns:pr="smNativeData" xmlns:p14="http://schemas.microsoft.com/office/powerpoint/2010/main" xmlns="" val="SMDATA_13_SgSuXhMAAAAlAAAAZAAAAA0AAAAAkAAAAEgAAACQAAAASAAAAAAAAAAAAAAAAAAAAAEAAABQAAAAAAAAAAAA4D8AAAAAAADgPwAAAAAAAOA/AAAAAAAA4D8AAAAAAADgPwAAAAAAAOA/AAAAAAAA4D8AAAAAAADgPwAAAAAAAOA/AAAAAAAA4D8CAAAAjAAAAAAAAAAAAAAAprcnDP///wgAAAAAAAAAAAAAAAAAAAAAAAAAAAAAAAAAAAAAZAAAAAEAAABAAAAAAAAAAAAAAAAAAAAAAAAAAAAAAAAAAAAAAAAAAAAAAAAAAAAAAAAAAAAAAAAAAAAAAAAAAAAAAAAAAAAAAAAAAAAAAAAAAAAAAAAAAAAAAAAAAAAAFAAAADwAAAAAAAAAAAAAAAAAAAAPAAAAAQAAACMAAAAjAAAAIwAAAB4AAAAAAAAAZAAAAGQAAAAAAAAAZAAAAGQAAAAVAAAAYAAAAAAAAAAAAAAADwAAACADAAAAAAAAAAAAAAEAAACgMgAAVgcAAKr4//8BAAAAf39/AAEAAABkAAAAAAAAABQAAABAHwAAAAAAACYAAAAAAAAAwOD//wAAAAAmAAAAZAAAABYAAABMAAAAAAAAAAAAAAAEAAAAAAAAAAEAAADd3d0KAAAAACgAAAAoAAAAZAAAAGQAAAAAAAAAzMzMAAAAAABQAAAAUAAAAGQAAABkAAAAAAAAABcAAAAUAAAAAAAAAAAAAAD/fwAA/38AAAAAAAAJAAAABAAAAHlsZT4MAAAAEAAAAAAAAAAAAAAAAAAAAAAAAAAeAAAAaAAAAAAAAAAAAAAAAAAAAAAAAAAAAAAAECcAABAnAAAAAAAAAAAAAAAAAAAAAAAAAAAAAAAAAAAAAAAAAAAAABQAAAAAAAAAwMD/AAAAAABkAAAAMgAAAAAAAABkAAAAAAAAAH9/fwAKAAAAHwAAAFQAAACmtycF////AQAAAAAAAAAAAAAAAAAAAAAAAAAAAAAAAAAAAAAAAAAAAAAAAH9/fwDd3d0DzMzMAMDA/wB/f38AAAAAAAAAAAAAAAAAAAAAAAAAAAAhAAAAGAAAABQAAACHAgAA/w8AABoXAAByJQAAAAAAACYAAAAIAAAA//////////8="/>
-              </a:ext>
-            </a:extLst>
-          </p:cNvSpPr>
-          <p:nvPr/>
-        </p:nvSpPr>
-        <p:spPr>
-          <a:xfrm>
-            <a:off x="1376545" y="1406225"/>
-            <a:ext cx="6982732" cy="4506504"/>
-          </a:xfrm>
-          <a:prstGeom prst="rect">
-            <a:avLst/>
-          </a:prstGeom>
-          <a:noFill/>
-          <a:ln>
-            <a:noFill/>
-          </a:ln>
-          <a:effectLst/>
-        </p:spPr>
-        <p:txBody>
-          <a:bodyPr vert="horz" wrap="square" lIns="91440" tIns="45720" rIns="91440" bIns="45720" numCol="1" spcCol="215900" anchor="t"/>
-          <a:lstStyle/>
-          <a:p>
-            <a:pPr>
-              <a:lnSpc>
-                <a:spcPct val="200000"/>
-              </a:lnSpc>
-              <a:defRPr lang="es-es" sz="2100"/>
-            </a:pPr>
-            <a:r>
-              <a:rPr dirty="0"/>
-              <a:t>Del análisis se desprende que...</a:t>
-            </a:r>
-          </a:p>
-          <a:p>
-            <a:pPr>
-              <a:lnSpc>
-                <a:spcPct val="200000"/>
-              </a:lnSpc>
-              <a:defRPr lang="es-es" sz="2100"/>
-            </a:pPr>
-            <a:endParaRPr dirty="0"/>
-          </a:p>
-          <a:p>
-            <a:pPr>
-              <a:lnSpc>
-                <a:spcPct val="200000"/>
-              </a:lnSpc>
-              <a:defRPr lang="es-es" sz="2100"/>
-            </a:pPr>
-            <a:r>
-              <a:rPr dirty="0"/>
-              <a:t>por lo que es una característica importante....</a:t>
-            </a:r>
-          </a:p>
-        </p:txBody>
-      </p:sp>
-    </p:spTree>
-    <p:extLst>
-      <p:ext uri="{BB962C8B-B14F-4D97-AF65-F5344CB8AC3E}">
-        <p14:creationId xmlns:p14="http://schemas.microsoft.com/office/powerpoint/2010/main" val="4099051591"/>
-      </p:ext>
-    </p:extLst>
-  </p:cSld>
-  <p:clrMapOvr>
-    <a:masterClrMapping/>
-  </p:clrMapOvr>
-</p:sld>
-</file>
-
-<file path=ppt/slides/slide9.xml><?xml version="1.0" encoding="utf-8"?>
-<p:sld xmlns:a="http://schemas.openxmlformats.org/drawingml/2006/main" xmlns:r="http://schemas.openxmlformats.org/officeDocument/2006/relationships" xmlns:p="http://schemas.openxmlformats.org/presentationml/2006/main">
-  <p:cSld>
-    <p:spTree>
-      <p:nvGrpSpPr>
-        <p:cNvPr id="1" name=""/>
-        <p:cNvGrpSpPr/>
-        <p:nvPr/>
-      </p:nvGrpSpPr>
-      <p:grpSpPr>
-        <a:xfrm>
-          <a:off x="0" y="0"/>
-          <a:ext cx="0" cy="0"/>
-          <a:chOff x="0" y="0"/>
-          <a:chExt cx="0" cy="0"/>
-        </a:xfrm>
-      </p:grpSpPr>
-      <p:sp>
-        <p:nvSpPr>
-          <p:cNvPr id="2" name="Título 1"/>
-          <p:cNvSpPr>
-            <a:spLocks noGrp="1"/>
-          </p:cNvSpPr>
-          <p:nvPr>
-            <p:ph type="title"/>
-          </p:nvPr>
-        </p:nvSpPr>
-        <p:spPr>
-          <a:xfrm>
-            <a:off x="1311230" y="174381"/>
-            <a:ext cx="4018416" cy="687768"/>
-          </a:xfrm>
-        </p:spPr>
-        <p:txBody>
-          <a:bodyPr/>
-          <a:lstStyle/>
-          <a:p>
-            <a:r>
-              <a:rPr lang="es-MX" dirty="0" smtClean="0"/>
-              <a:t>Análisis de datos</a:t>
-            </a:r>
-            <a:endParaRPr lang="es-MX" dirty="0"/>
-          </a:p>
-        </p:txBody>
-      </p:sp>
-      <p:sp>
-        <p:nvSpPr>
-          <p:cNvPr id="5" name="CuadroTexto 6"/>
-          <p:cNvSpPr>
-            <a:extLst>
-              <a:ext uri="smNativeData">
-                <pr:smNativeData xmlns:pr="smNativeData" xmlns:p14="http://schemas.microsoft.com/office/powerpoint/2010/main" xmlns="" val="SMDATA_13_SgSuXhMAAAAlAAAAZAAAAE0AAAAAkAAAAEgAAACQAAAASAAAAAAAAAAAAAAAAAAAAAEAAABQAAAAAAAAAAAA4D8AAAAAAADgPwAAAAAAAOA/AAAAAAAA4D8AAAAAAADgPwAAAAAAAOA/AAAAAAAA4D8AAAAAAADgPwAAAAAAAOA/AAAAAAAA4D8CAAAAjAAAAAAAAAAAAAAAprcnDP///wgAAAAAAAAAAAAAAAAAAAAAAAAAAAAAAAAAAAAAZAAAAAEAAABAAAAAAAAAAAAAAAAAAAAAAAAAAAAAAAAAAAAAAAAAAAAAAAAAAAAAAAAAAAAAAAAAAAAAAAAAAAAAAAAAAAAAAAAAAAAAAAAAAAAAAAAAAAAAAAAAAAAAFAAAADwAAAAAAAAAAAAAAAAAAAAPAAAAAQAAACMAAAAjAAAAIwAAAB4AAAAAAAAAZAAAAGQAAAAAAAAAZAAAAGQAAAAVAAAAYAAAAAAAAAAAAAAADwAAACADAAAAAAAAAAAAAAEAAACgMgAAVgcAAKr4//8BAAAAf39/AAEAAABkAAAAAAAAABQAAABAHwAAAAAAACYAAAAAAAAAwOD//wAAAAAmAAAAZAAAABYAAABMAAAAAAAAAAAAAAAEAAAAAAAAAAEAAADd3d0KAAAAACgAAAAoAAAAZAAAAGQAAAAAAAAAzMzMAAAAAABQAAAAUAAAAGQAAABkAAAAAAAAABcAAAAUAAAAAAAAAAAAAAD/fwAA/38AAAAAAAAJAAAABAAAAAAAAAAMAAAAEAAAAAAAAAAAAAAAAAAAAAAAAAAeAAAAaAAAAAAAAAAAAAAAAAAAAAAAAAAAAAAAECcAABAnAAAAAAAAAAAAAAAAAAAAAAAAAAAAAAAAAAAAAAAAAAAAABQAAAAAAAAAwMD/AAAAAABkAAAAMgAAAAAAAABkAAAAAAAAAH9/fwAKAAAAHwAAAFQAAACmtycF////AQAAAAAAAAAAAAAAAAAAAAAAAAAAAAAAAAAAAAAAAAAAAAAAAH9/fwDd3d0DzMzMAMDA/wB/f38AAAAAAAAAAAAAAAAAAAAAAAAAAAAhAAAAGAAAABQAAADnBAAAXAkAAHQkAABODQAAECAAACYAAAAIAAAA//////////8="/>
-              </a:ext>
-            </a:extLst>
-          </p:cNvSpPr>
-          <p:nvPr/>
-        </p:nvSpPr>
-        <p:spPr>
-          <a:xfrm>
-            <a:off x="1311231" y="862149"/>
-            <a:ext cx="1405844" cy="641350"/>
-          </a:xfrm>
-          <a:prstGeom prst="rect">
-            <a:avLst/>
-          </a:prstGeom>
-          <a:noFill/>
-          <a:ln>
-            <a:noFill/>
-          </a:ln>
-          <a:effectLst/>
-        </p:spPr>
-        <p:txBody>
-          <a:bodyPr vert="horz" wrap="square" lIns="91440" tIns="45720" rIns="91440" bIns="45720" numCol="1" spcCol="215900" anchor="t"/>
-          <a:lstStyle/>
-          <a:p>
-            <a:pPr>
-              <a:lnSpc>
-                <a:spcPct val="200000"/>
-              </a:lnSpc>
-              <a:defRPr lang="en-us"/>
-            </a:pPr>
-            <a:r>
-              <a:rPr lang="es-es" sz="2100" dirty="0">
-                <a:solidFill>
-                  <a:schemeClr val="accent3"/>
-                </a:solidFill>
-              </a:rPr>
-              <a:t>•</a:t>
-            </a:r>
-            <a:r>
-              <a:rPr lang="es-es" sz="2100" dirty="0">
-                <a:solidFill>
-                  <a:schemeClr val="accent1"/>
-                </a:solidFill>
-              </a:rPr>
-              <a:t> </a:t>
-            </a:r>
-            <a:r>
-              <a:rPr lang="es-es" sz="2100" u="sng" dirty="0"/>
-              <a:t>Tiempos</a:t>
-            </a:r>
-          </a:p>
-        </p:txBody>
-      </p:sp>
-      <p:sp>
-        <p:nvSpPr>
-          <p:cNvPr id="7" name="Rectángulo1"/>
-          <p:cNvSpPr>
-            <a:extLst>
-              <a:ext uri="smNativeData">
-                <pr:smNativeData xmlns:pr="smNativeData" xmlns:p14="http://schemas.microsoft.com/office/powerpoint/2010/main" xmlns="" val="SMDATA_13_SgSuXhMAAAAlAAAAZAAAAA0AAAAAkAAAAEgAAACQAAAASAAAAAAAAAAAAAAAAAAAAAEAAABQAAAAAAAAAAAA4D8AAAAAAADgPwAAAAAAAOA/AAAAAAAA4D8AAAAAAADgPwAAAAAAAOA/AAAAAAAA4D8AAAAAAADgPwAAAAAAAOA/AAAAAAAA4D8CAAAAjAAAAAAAAAAAAAAAprcnDP///wgAAAAAAAAAAAAAAAAAAAAAAAAAAAAAAAAAAAAAZAAAAAEAAABAAAAAAAAAAAAAAAAAAAAAAAAAAAAAAAAAAAAAAAAAAAAAAAAAAAAAAAAAAAAAAAAAAAAAAAAAAAAAAAAAAAAAAAAAAAAAAAAAAAAAAAAAAAAAAAAAAAAAFAAAADwAAAAAAAAAAAAAAAAAAAAPAAAAAQAAACMAAAAjAAAAIwAAAB4AAAAAAAAAZAAAAGQAAAAAAAAAZAAAAGQAAAAVAAAAYAAAAAAAAAAAAAAADwAAACADAAAAAAAAAAAAAAEAAACgMgAAVgcAAKr4//8BAAAAf39/AAEAAABkAAAAAAAAABQAAABAHwAAAAAAACYAAAAAAAAAwOD//wAAAAAmAAAAZAAAABYAAABMAAAAAAAAAAAAAAAEAAAAAAAAAAEAAADd3d0KAAAAACgAAAAoAAAAZAAAAGQAAAAAAAAAzMzMAAAAAABQAAAAUAAAAGQAAABkAAAAAAAAABcAAAAUAAAAAAAAAAAAAAD/fwAA/38AAAAAAAAJAAAABAAAAHlsZT4MAAAAEAAAAAAAAAAAAAAAAAAAAAAAAAAeAAAAaAAAAAAAAAAAAAAAAAAAAAAAAAAAAAAAECcAABAnAAAAAAAAAAAAAAAAAAAAAAAAAAAAAAAAAAAAAAAAAAAAABQAAAAAAAAAwMD/AAAAAABkAAAAMgAAAAAAAABkAAAAAAAAAH9/fwAKAAAAHwAAAFQAAACmtycF////AQAAAAAAAAAAAAAAAAAAAAAAAAAAAAAAAAAAAAAAAAAAAAAAAH9/fwDd3d0DzMzMAMDA/wB/f38AAAAAAAAAAAAAAAAAAAAAAAAAAAAhAAAAGAAAABQAAACHAgAA/w8AABoXAAByJQAAAAAAACYAAAAIAAAA//////////8="/>
-              </a:ext>
-            </a:extLst>
-          </p:cNvSpPr>
-          <p:nvPr/>
-        </p:nvSpPr>
-        <p:spPr>
-          <a:xfrm>
-            <a:off x="1311230" y="1672862"/>
-            <a:ext cx="5676446" cy="3486785"/>
-          </a:xfrm>
-          <a:prstGeom prst="rect">
-            <a:avLst/>
-          </a:prstGeom>
-          <a:noFill/>
-          <a:ln>
-            <a:noFill/>
-          </a:ln>
-          <a:effectLst/>
-        </p:spPr>
-        <p:txBody>
-          <a:bodyPr vert="horz" wrap="square" lIns="91440" tIns="45720" rIns="91440" bIns="45720" numCol="1" spcCol="215900" anchor="t"/>
-          <a:lstStyle/>
-          <a:p>
-            <a:pPr>
-              <a:lnSpc>
-                <a:spcPct val="200000"/>
-              </a:lnSpc>
-              <a:defRPr lang="es-es" sz="2100"/>
-            </a:pPr>
-            <a:r>
-              <a:rPr dirty="0"/>
-              <a:t>En este caso podemos ver que....</a:t>
-            </a:r>
-          </a:p>
-          <a:p>
-            <a:pPr>
-              <a:lnSpc>
-                <a:spcPct val="200000"/>
-              </a:lnSpc>
-              <a:defRPr lang="es-es" sz="2100"/>
-            </a:pPr>
-            <a:endParaRPr dirty="0"/>
-          </a:p>
-          <a:p>
-            <a:pPr>
-              <a:lnSpc>
-                <a:spcPct val="200000"/>
-              </a:lnSpc>
-              <a:defRPr lang="es-es" sz="2100"/>
-            </a:pPr>
-            <a:r>
-              <a:rPr dirty="0"/>
-              <a:t>Por eso recomendamos no usar estos datos...</a:t>
-            </a:r>
-          </a:p>
-        </p:txBody>
-      </p:sp>
-    </p:spTree>
-    <p:extLst>
-      <p:ext uri="{BB962C8B-B14F-4D97-AF65-F5344CB8AC3E}">
-        <p14:creationId xmlns:p14="http://schemas.microsoft.com/office/powerpoint/2010/main" val="4135387291"/>
       </p:ext>
     </p:extLst>
   </p:cSld>

</xml_diff>

<commit_message>
modifico ppt para presentacion
</commit_message>
<xml_diff>
--- a/Diplomatura data science.pptx
+++ b/Diplomatura data science.pptx
@@ -12,6 +12,9 @@
     <p:sldId id="260" r:id="rId6"/>
     <p:sldId id="261" r:id="rId7"/>
     <p:sldId id="262" r:id="rId8"/>
+    <p:sldId id="264" r:id="rId9"/>
+    <p:sldId id="265" r:id="rId10"/>
+    <p:sldId id="266" r:id="rId11"/>
   </p:sldIdLst>
   <p:sldSz cx="12192000" cy="6858000"/>
   <p:notesSz cx="6858000" cy="9144000"/>
@@ -12447,6 +12450,177 @@
 </p:sld>
 </file>
 
+<file path=ppt/slides/slide10.xml><?xml version="1.0" encoding="utf-8"?>
+<p:sld xmlns:a="http://schemas.openxmlformats.org/drawingml/2006/main" xmlns:r="http://schemas.openxmlformats.org/officeDocument/2006/relationships" xmlns:p="http://schemas.openxmlformats.org/presentationml/2006/main">
+  <p:cSld>
+    <p:spTree>
+      <p:nvGrpSpPr>
+        <p:cNvPr id="1" name=""/>
+        <p:cNvGrpSpPr/>
+        <p:nvPr/>
+      </p:nvGrpSpPr>
+      <p:grpSpPr>
+        <a:xfrm>
+          <a:off x="0" y="0"/>
+          <a:ext cx="0" cy="0"/>
+          <a:chOff x="0" y="0"/>
+          <a:chExt cx="0" cy="0"/>
+        </a:xfrm>
+      </p:grpSpPr>
+      <p:sp>
+        <p:nvSpPr>
+          <p:cNvPr id="2" name="Título 1"/>
+          <p:cNvSpPr>
+            <a:spLocks noGrp="1"/>
+          </p:cNvSpPr>
+          <p:nvPr>
+            <p:ph type="title"/>
+          </p:nvPr>
+        </p:nvSpPr>
+        <p:spPr>
+          <a:xfrm>
+            <a:off x="1285105" y="239695"/>
+            <a:ext cx="4083730" cy="700831"/>
+          </a:xfrm>
+        </p:spPr>
+        <p:txBody>
+          <a:bodyPr/>
+          <a:lstStyle/>
+          <a:p>
+            <a:r>
+              <a:rPr lang="es-MX" dirty="0" smtClean="0"/>
+              <a:t>Limpieza de datos</a:t>
+            </a:r>
+            <a:endParaRPr lang="es-MX" dirty="0"/>
+          </a:p>
+        </p:txBody>
+      </p:sp>
+      <p:sp>
+        <p:nvSpPr>
+          <p:cNvPr id="4" name="CuadroTexto 5"/>
+          <p:cNvSpPr>
+            <a:extLst>
+              <a:ext uri="smNativeData">
+                <pr:smNativeData xmlns="" xmlns:p14="http://schemas.microsoft.com/office/powerpoint/2010/main" xmlns:pr="smNativeData" val="SMDATA_13_SgSuXhMAAAAlAAAAZAAAAE0AAAAAkAAAAEgAAACQAAAASAAAAAAAAAAAAAAAAAAAAAEAAABQAAAAAAAAAAAA4D8AAAAAAADgPwAAAAAAAOA/AAAAAAAA4D8AAAAAAADgPwAAAAAAAOA/AAAAAAAA4D8AAAAAAADgPwAAAAAAAOA/AAAAAAAA4D8CAAAAjAAAAAAAAAAAAAAAprcnDP///wgAAAAAAAAAAAAAAAAAAAAAAAAAAAAAAAAAAAAAZAAAAAEAAABAAAAAAAAAAAAAAAAAAAAAAAAAAAAAAAAAAAAAAAAAAAAAAAAAAAAAAAAAAAAAAAAAAAAAAAAAAAAAAAAAAAAAAAAAAAAAAAAAAAAAAAAAAAAAAAAAAAAAFAAAADwAAAAAAAAAAAAAAAAAAAAPAAAAAQAAACMAAAAjAAAAIwAAAB4AAAAAAAAAZAAAAGQAAAAAAAAAZAAAAGQAAAAVAAAAYAAAAAAAAAAAAAAADwAAACADAAAAAAAAAAAAAAEAAACgMgAAVgcAAKr4//8BAAAAf39/AAEAAABkAAAAAAAAABQAAABAHwAAAAAAACYAAAAAAAAAwOD//wAAAAAmAAAAZAAAABYAAABMAAAAAAAAAAAAAAAEAAAAAAAAAAEAAADd3d0KAAAAACgAAAAoAAAAZAAAAGQAAAAAAAAAzMzMAAAAAABQAAAAUAAAAGQAAABkAAAAAAAAABcAAAAUAAAAAAAAAAAAAAD/fwAA/38AAAAAAAAJAAAABAAAAAYAAAAMAAAAEAAAAAAAAAAAAAAAAAAAAAAAAAAeAAAAaAAAAAAAAAAAAAAAAAAAAAAAAAAAAAAAECcAABAnAAAAAAAAAAAAAAAAAAAAAAAAAAAAAAAAAAAAAAAAAAAAABQAAAAAAAAAwMD/AAAAAABkAAAAMgAAAAAAAABkAAAAAAAAAH9/fwAKAAAAHwAAAFQAAACmtycF////AQAAAAAAAAAAAAAAAAAAAAAAAAAAAAAAAAAAAAAAAAAAAAAAAH9/fwDd3d0DzMzMAMDA/wB/f38AAAAAAAAAAAAAAAAAAAAAAAAAAAAhAAAAGAAAABQAAADnBAAAXAkAAHQkAABsKQAAACAAACYAAAAIAAAA//////////8="/>
+              </a:ext>
+            </a:extLst>
+          </p:cNvSpPr>
+          <p:nvPr/>
+        </p:nvSpPr>
+        <p:spPr>
+          <a:xfrm>
+            <a:off x="1005930" y="940526"/>
+            <a:ext cx="10306504" cy="5499463"/>
+          </a:xfrm>
+          <a:prstGeom prst="rect">
+            <a:avLst/>
+          </a:prstGeom>
+          <a:noFill/>
+          <a:ln>
+            <a:noFill/>
+          </a:ln>
+          <a:effectLst/>
+        </p:spPr>
+        <p:txBody>
+          <a:bodyPr vert="horz" wrap="square" lIns="91440" tIns="45720" rIns="91440" bIns="45720" numCol="1" spcCol="215900" anchor="t"/>
+          <a:lstStyle/>
+          <a:p>
+            <a:pPr>
+              <a:lnSpc>
+                <a:spcPct val="200000"/>
+              </a:lnSpc>
+              <a:defRPr lang="es-es" sz="2100"/>
+            </a:pPr>
+            <a:r>
+              <a:rPr dirty="0"/>
+              <a:t>En el proceso de limpieza se realizo</a:t>
+            </a:r>
+            <a:r>
+              <a:rPr dirty="0" smtClean="0"/>
+              <a:t>:</a:t>
+            </a:r>
+            <a:endParaRPr dirty="0"/>
+          </a:p>
+          <a:p>
+            <a:pPr marL="342900" indent="-342900">
+              <a:lnSpc>
+                <a:spcPct val="200000"/>
+              </a:lnSpc>
+              <a:buFont typeface="Arial" panose="020B0604020202020204" pitchFamily="34" charset="0"/>
+              <a:buChar char="•"/>
+              <a:defRPr lang="es-es" sz="2100"/>
+            </a:pPr>
+            <a:r>
+              <a:rPr u="sng" dirty="0" smtClean="0"/>
+              <a:t>En </a:t>
+            </a:r>
+            <a:r>
+              <a:rPr u="sng" dirty="0"/>
+              <a:t>cuanto a </a:t>
+            </a:r>
+            <a:r>
+              <a:rPr u="sng" dirty="0" smtClean="0"/>
+              <a:t>duplicados:</a:t>
+            </a:r>
+          </a:p>
+          <a:p>
+            <a:pPr>
+              <a:lnSpc>
+                <a:spcPct val="200000"/>
+              </a:lnSpc>
+              <a:defRPr lang="es-es" sz="2100"/>
+            </a:pPr>
+            <a:r>
+              <a:rPr lang="es-ES" dirty="0" smtClean="0"/>
+              <a:t>Encontramos información que es duplicada que puede ser obtenida haciendo cálculos sobre las columnas, por ejemplo para el caso de los montos de recargas y los packs el desglose a nivel semanal al sumarlo nos daba la columna de su acumulado mensual, por lo que decidimos quitar estas columnas para no repetir datos.</a:t>
+            </a:r>
+            <a:endParaRPr dirty="0"/>
+          </a:p>
+        </p:txBody>
+      </p:sp>
+      <p:pic>
+        <p:nvPicPr>
+          <p:cNvPr id="5" name="Imagen 4"/>
+          <p:cNvPicPr>
+            <a:picLocks noChangeAspect="1"/>
+          </p:cNvPicPr>
+          <p:nvPr/>
+        </p:nvPicPr>
+        <p:blipFill>
+          <a:blip r:embed="rId2">
+            <a:extLst>
+              <a:ext uri="{28A0092B-C50C-407E-A947-70E740481C1C}">
+                <a14:useLocalDpi xmlns:a14="http://schemas.microsoft.com/office/drawing/2010/main" val="0"/>
+              </a:ext>
+            </a:extLst>
+          </a:blip>
+          <a:stretch>
+            <a:fillRect/>
+          </a:stretch>
+        </p:blipFill>
+        <p:spPr>
+          <a:xfrm>
+            <a:off x="7797573" y="590110"/>
+            <a:ext cx="2867025" cy="1600200"/>
+          </a:xfrm>
+          <a:prstGeom prst="rect">
+            <a:avLst/>
+          </a:prstGeom>
+        </p:spPr>
+      </p:pic>
+    </p:spTree>
+    <p:extLst>
+      <p:ext uri="{BB962C8B-B14F-4D97-AF65-F5344CB8AC3E}">
+        <p14:creationId xmlns:p14="http://schemas.microsoft.com/office/powerpoint/2010/main" val="578151812"/>
+      </p:ext>
+    </p:extLst>
+  </p:cSld>
+  <p:clrMapOvr>
+    <a:masterClrMapping/>
+  </p:clrMapOvr>
+</p:sld>
+</file>
+
 <file path=ppt/slides/slide2.xml><?xml version="1.0" encoding="utf-8"?>
 <p:sld xmlns:a="http://schemas.openxmlformats.org/drawingml/2006/main" xmlns:r="http://schemas.openxmlformats.org/officeDocument/2006/relationships" xmlns:p="http://schemas.openxmlformats.org/presentationml/2006/main">
   <p:cSld>
@@ -13087,8 +13261,8 @@
         </p:nvSpPr>
         <p:spPr>
           <a:xfrm>
-            <a:off x="1285103" y="122130"/>
-            <a:ext cx="4553993" cy="1478570"/>
+            <a:off x="1447901" y="41860"/>
+            <a:ext cx="4644460" cy="846858"/>
           </a:xfrm>
         </p:spPr>
         <p:txBody>
@@ -13120,7 +13294,7 @@
         </p:nvSpPr>
         <p:spPr>
           <a:xfrm>
-            <a:off x="2055813" y="1600700"/>
+            <a:off x="1839351" y="636022"/>
             <a:ext cx="7258005" cy="4833256"/>
           </a:xfrm>
           <a:prstGeom prst="rect">
@@ -13134,7 +13308,7 @@
         </p:spPr>
         <p:txBody>
           <a:bodyPr vert="horz" wrap="square" lIns="91440" tIns="45720" rIns="91440" bIns="45720" numCol="1" spcCol="215900" anchor="t">
-            <a:normAutofit fontScale="77500" lnSpcReduction="20000"/>
+            <a:noAutofit/>
           </a:bodyPr>
           <a:lstStyle/>
           <a:p>
@@ -13314,6 +13488,156 @@
           </a:p>
         </p:txBody>
       </p:sp>
+      <p:pic>
+        <p:nvPicPr>
+          <p:cNvPr id="7" name="Imagen 6"/>
+          <p:cNvPicPr>
+            <a:picLocks noChangeAspect="1"/>
+          </p:cNvPicPr>
+          <p:nvPr/>
+        </p:nvPicPr>
+        <p:blipFill>
+          <a:blip r:embed="rId2">
+            <a:extLst>
+              <a:ext uri="{28A0092B-C50C-407E-A947-70E740481C1C}">
+                <a14:useLocalDpi xmlns:a14="http://schemas.microsoft.com/office/drawing/2010/main" val="0"/>
+              </a:ext>
+            </a:extLst>
+          </a:blip>
+          <a:stretch>
+            <a:fillRect/>
+          </a:stretch>
+        </p:blipFill>
+        <p:spPr>
+          <a:xfrm flipH="1">
+            <a:off x="9894523" y="2558647"/>
+            <a:ext cx="1316017" cy="1316017"/>
+          </a:xfrm>
+          <a:prstGeom prst="rect">
+            <a:avLst/>
+          </a:prstGeom>
+        </p:spPr>
+      </p:pic>
+      <p:pic>
+        <p:nvPicPr>
+          <p:cNvPr id="8" name="Imagen 7"/>
+          <p:cNvPicPr>
+            <a:picLocks noChangeAspect="1"/>
+          </p:cNvPicPr>
+          <p:nvPr/>
+        </p:nvPicPr>
+        <p:blipFill>
+          <a:blip r:embed="rId3">
+            <a:extLst>
+              <a:ext uri="{28A0092B-C50C-407E-A947-70E740481C1C}">
+                <a14:useLocalDpi xmlns:a14="http://schemas.microsoft.com/office/drawing/2010/main" val="0"/>
+              </a:ext>
+            </a:extLst>
+          </a:blip>
+          <a:stretch>
+            <a:fillRect/>
+          </a:stretch>
+        </p:blipFill>
+        <p:spPr>
+          <a:xfrm flipH="1">
+            <a:off x="7841584" y="3128384"/>
+            <a:ext cx="1316017" cy="1316017"/>
+          </a:xfrm>
+          <a:prstGeom prst="rect">
+            <a:avLst/>
+          </a:prstGeom>
+        </p:spPr>
+      </p:pic>
+      <p:pic>
+        <p:nvPicPr>
+          <p:cNvPr id="9" name="Imagen 8"/>
+          <p:cNvPicPr>
+            <a:picLocks noChangeAspect="1"/>
+          </p:cNvPicPr>
+          <p:nvPr/>
+        </p:nvPicPr>
+        <p:blipFill>
+          <a:blip r:embed="rId4">
+            <a:extLst>
+              <a:ext uri="{28A0092B-C50C-407E-A947-70E740481C1C}">
+                <a14:useLocalDpi xmlns:a14="http://schemas.microsoft.com/office/drawing/2010/main" val="0"/>
+              </a:ext>
+            </a:extLst>
+          </a:blip>
+          <a:stretch>
+            <a:fillRect/>
+          </a:stretch>
+        </p:blipFill>
+        <p:spPr>
+          <a:xfrm flipH="1">
+            <a:off x="7422916" y="1385107"/>
+            <a:ext cx="2032866" cy="1173540"/>
+          </a:xfrm>
+          <a:prstGeom prst="rect">
+            <a:avLst/>
+          </a:prstGeom>
+        </p:spPr>
+      </p:pic>
+      <p:pic>
+        <p:nvPicPr>
+          <p:cNvPr id="10" name="Imagen 9"/>
+          <p:cNvPicPr>
+            <a:picLocks noChangeAspect="1"/>
+          </p:cNvPicPr>
+          <p:nvPr/>
+        </p:nvPicPr>
+        <p:blipFill>
+          <a:blip r:embed="rId5">
+            <a:extLst>
+              <a:ext uri="{28A0092B-C50C-407E-A947-70E740481C1C}">
+                <a14:useLocalDpi xmlns:a14="http://schemas.microsoft.com/office/drawing/2010/main" val="0"/>
+              </a:ext>
+            </a:extLst>
+          </a:blip>
+          <a:stretch>
+            <a:fillRect/>
+          </a:stretch>
+        </p:blipFill>
+        <p:spPr>
+          <a:xfrm>
+            <a:off x="6369809" y="4920720"/>
+            <a:ext cx="1316017" cy="1316017"/>
+          </a:xfrm>
+          <a:prstGeom prst="rect">
+            <a:avLst/>
+          </a:prstGeom>
+        </p:spPr>
+      </p:pic>
+      <p:pic>
+        <p:nvPicPr>
+          <p:cNvPr id="11" name="Imagen 10"/>
+          <p:cNvPicPr>
+            <a:picLocks noChangeAspect="1"/>
+          </p:cNvPicPr>
+          <p:nvPr/>
+        </p:nvPicPr>
+        <p:blipFill>
+          <a:blip r:embed="rId6">
+            <a:extLst>
+              <a:ext uri="{28A0092B-C50C-407E-A947-70E740481C1C}">
+                <a14:useLocalDpi xmlns:a14="http://schemas.microsoft.com/office/drawing/2010/main" val="0"/>
+              </a:ext>
+            </a:extLst>
+          </a:blip>
+          <a:stretch>
+            <a:fillRect/>
+          </a:stretch>
+        </p:blipFill>
+        <p:spPr>
+          <a:xfrm>
+            <a:off x="9078685" y="4998022"/>
+            <a:ext cx="1238715" cy="1238715"/>
+          </a:xfrm>
+          <a:prstGeom prst="rect">
+            <a:avLst/>
+          </a:prstGeom>
+        </p:spPr>
+      </p:pic>
     </p:spTree>
     <p:extLst>
       <p:ext uri="{BB962C8B-B14F-4D97-AF65-F5344CB8AC3E}">
@@ -13524,7 +13848,7 @@
               <a:rPr dirty="0" smtClean="0"/>
               <a:t>:	</a:t>
             </a:r>
-            <a:endParaRPr dirty="0"/>
+            <a:endParaRPr dirty="0" smtClean="0"/>
           </a:p>
           <a:p>
             <a:pPr>
@@ -13533,6 +13857,247 @@
               </a:lnSpc>
               <a:defRPr lang="es-es" sz="2100"/>
             </a:pPr>
+            <a:r>
+              <a:rPr lang="es-ES" dirty="0" smtClean="0"/>
+              <a:t>Eliminamos datos nulos que formaban parte de los datos categóricos </a:t>
+            </a:r>
+            <a:r>
+              <a:rPr lang="es-ES" dirty="0" err="1" smtClean="0"/>
+              <a:t>network</a:t>
+            </a:r>
+            <a:r>
+              <a:rPr lang="es-ES" dirty="0" smtClean="0"/>
+              <a:t> </a:t>
+            </a:r>
+            <a:r>
+              <a:rPr lang="es-ES" dirty="0" err="1" smtClean="0"/>
+              <a:t>tech</a:t>
+            </a:r>
+            <a:r>
+              <a:rPr lang="es-ES" dirty="0" smtClean="0"/>
+              <a:t>, </a:t>
+            </a:r>
+            <a:r>
+              <a:rPr lang="es-ES" dirty="0" err="1" smtClean="0"/>
+              <a:t>device</a:t>
+            </a:r>
+            <a:r>
+              <a:rPr lang="es-ES" dirty="0" smtClean="0"/>
+              <a:t> </a:t>
+            </a:r>
+            <a:r>
+              <a:rPr lang="es-ES" dirty="0" err="1" smtClean="0"/>
+              <a:t>model</a:t>
+            </a:r>
+            <a:r>
+              <a:rPr lang="es-ES" dirty="0" smtClean="0"/>
+              <a:t> </a:t>
+            </a:r>
+            <a:r>
+              <a:rPr lang="es-ES" dirty="0" err="1" smtClean="0"/>
+              <a:t>name</a:t>
+            </a:r>
+            <a:r>
+              <a:rPr lang="es-ES" dirty="0" smtClean="0"/>
+              <a:t> y </a:t>
+            </a:r>
+            <a:r>
+              <a:rPr lang="es-ES" dirty="0" err="1" smtClean="0"/>
+              <a:t>device</a:t>
+            </a:r>
+            <a:r>
+              <a:rPr lang="es-ES" dirty="0" smtClean="0"/>
+              <a:t> </a:t>
+            </a:r>
+            <a:r>
+              <a:rPr lang="es-ES" dirty="0" err="1" smtClean="0"/>
+              <a:t>vendor</a:t>
+            </a:r>
+            <a:r>
+              <a:rPr lang="es-ES" dirty="0" smtClean="0"/>
+              <a:t> </a:t>
+            </a:r>
+            <a:r>
+              <a:rPr lang="es-ES" dirty="0" err="1" smtClean="0"/>
+              <a:t>name</a:t>
+            </a:r>
+            <a:r>
+              <a:rPr lang="es-ES" dirty="0" smtClean="0"/>
+              <a:t>. </a:t>
+            </a:r>
+          </a:p>
+          <a:p>
+            <a:pPr>
+              <a:lnSpc>
+                <a:spcPct val="200000"/>
+              </a:lnSpc>
+              <a:defRPr lang="es-es" sz="2100"/>
+            </a:pPr>
+            <a:r>
+              <a:rPr lang="es-ES" dirty="0" smtClean="0"/>
+              <a:t>Estos datos contenían valores </a:t>
+            </a:r>
+            <a:r>
+              <a:rPr lang="es-ES" dirty="0" err="1" smtClean="0"/>
+              <a:t>NaN</a:t>
+            </a:r>
+            <a:r>
+              <a:rPr lang="es-ES" dirty="0" smtClean="0"/>
+              <a:t> y “NOT_IDENTIFIED”.</a:t>
+            </a:r>
+          </a:p>
+          <a:p>
+            <a:pPr>
+              <a:lnSpc>
+                <a:spcPct val="200000"/>
+              </a:lnSpc>
+              <a:defRPr lang="es-es" sz="2100"/>
+            </a:pPr>
+            <a:endParaRPr lang="es-ES" dirty="0" smtClean="0"/>
+          </a:p>
+          <a:p>
+            <a:pPr>
+              <a:lnSpc>
+                <a:spcPct val="200000"/>
+              </a:lnSpc>
+              <a:defRPr lang="es-es" sz="2100"/>
+            </a:pPr>
+            <a:endParaRPr dirty="0"/>
+          </a:p>
+        </p:txBody>
+      </p:sp>
+      <p:pic>
+        <p:nvPicPr>
+          <p:cNvPr id="3" name="Imagen 2"/>
+          <p:cNvPicPr>
+            <a:picLocks noChangeAspect="1"/>
+          </p:cNvPicPr>
+          <p:nvPr/>
+        </p:nvPicPr>
+        <p:blipFill>
+          <a:blip r:embed="rId2">
+            <a:extLst>
+              <a:ext uri="{28A0092B-C50C-407E-A947-70E740481C1C}">
+                <a14:useLocalDpi xmlns:a14="http://schemas.microsoft.com/office/drawing/2010/main" val="0"/>
+              </a:ext>
+            </a:extLst>
+          </a:blip>
+          <a:stretch>
+            <a:fillRect/>
+          </a:stretch>
+        </p:blipFill>
+        <p:spPr>
+          <a:xfrm>
+            <a:off x="7550331" y="590110"/>
+            <a:ext cx="2845934" cy="1539604"/>
+          </a:xfrm>
+          <a:prstGeom prst="rect">
+            <a:avLst/>
+          </a:prstGeom>
+        </p:spPr>
+      </p:pic>
+    </p:spTree>
+    <p:extLst>
+      <p:ext uri="{BB962C8B-B14F-4D97-AF65-F5344CB8AC3E}">
+        <p14:creationId xmlns:p14="http://schemas.microsoft.com/office/powerpoint/2010/main" val="2332238334"/>
+      </p:ext>
+    </p:extLst>
+  </p:cSld>
+  <p:clrMapOvr>
+    <a:masterClrMapping/>
+  </p:clrMapOvr>
+</p:sld>
+</file>
+
+<file path=ppt/slides/slide8.xml><?xml version="1.0" encoding="utf-8"?>
+<p:sld xmlns:a="http://schemas.openxmlformats.org/drawingml/2006/main" xmlns:r="http://schemas.openxmlformats.org/officeDocument/2006/relationships" xmlns:p="http://schemas.openxmlformats.org/presentationml/2006/main">
+  <p:cSld>
+    <p:spTree>
+      <p:nvGrpSpPr>
+        <p:cNvPr id="1" name=""/>
+        <p:cNvGrpSpPr/>
+        <p:nvPr/>
+      </p:nvGrpSpPr>
+      <p:grpSpPr>
+        <a:xfrm>
+          <a:off x="0" y="0"/>
+          <a:ext cx="0" cy="0"/>
+          <a:chOff x="0" y="0"/>
+          <a:chExt cx="0" cy="0"/>
+        </a:xfrm>
+      </p:grpSpPr>
+      <p:sp>
+        <p:nvSpPr>
+          <p:cNvPr id="2" name="Título 1"/>
+          <p:cNvSpPr>
+            <a:spLocks noGrp="1"/>
+          </p:cNvSpPr>
+          <p:nvPr>
+            <p:ph type="title"/>
+          </p:nvPr>
+        </p:nvSpPr>
+        <p:spPr>
+          <a:xfrm>
+            <a:off x="1285105" y="239695"/>
+            <a:ext cx="4083730" cy="700831"/>
+          </a:xfrm>
+        </p:spPr>
+        <p:txBody>
+          <a:bodyPr/>
+          <a:lstStyle/>
+          <a:p>
+            <a:r>
+              <a:rPr lang="es-MX" dirty="0" smtClean="0"/>
+              <a:t>Limpieza de datos</a:t>
+            </a:r>
+            <a:endParaRPr lang="es-MX" dirty="0"/>
+          </a:p>
+        </p:txBody>
+      </p:sp>
+      <p:sp>
+        <p:nvSpPr>
+          <p:cNvPr id="4" name="CuadroTexto 5"/>
+          <p:cNvSpPr>
+            <a:extLst>
+              <a:ext uri="smNativeData">
+                <pr:smNativeData xmlns="" xmlns:p14="http://schemas.microsoft.com/office/powerpoint/2010/main" xmlns:pr="smNativeData" val="SMDATA_13_SgSuXhMAAAAlAAAAZAAAAE0AAAAAkAAAAEgAAACQAAAASAAAAAAAAAAAAAAAAAAAAAEAAABQAAAAAAAAAAAA4D8AAAAAAADgPwAAAAAAAOA/AAAAAAAA4D8AAAAAAADgPwAAAAAAAOA/AAAAAAAA4D8AAAAAAADgPwAAAAAAAOA/AAAAAAAA4D8CAAAAjAAAAAAAAAAAAAAAprcnDP///wgAAAAAAAAAAAAAAAAAAAAAAAAAAAAAAAAAAAAAZAAAAAEAAABAAAAAAAAAAAAAAAAAAAAAAAAAAAAAAAAAAAAAAAAAAAAAAAAAAAAAAAAAAAAAAAAAAAAAAAAAAAAAAAAAAAAAAAAAAAAAAAAAAAAAAAAAAAAAAAAAAAAAFAAAADwAAAAAAAAAAAAAAAAAAAAPAAAAAQAAACMAAAAjAAAAIwAAAB4AAAAAAAAAZAAAAGQAAAAAAAAAZAAAAGQAAAAVAAAAYAAAAAAAAAAAAAAADwAAACADAAAAAAAAAAAAAAEAAACgMgAAVgcAAKr4//8BAAAAf39/AAEAAABkAAAAAAAAABQAAABAHwAAAAAAACYAAAAAAAAAwOD//wAAAAAmAAAAZAAAABYAAABMAAAAAAAAAAAAAAAEAAAAAAAAAAEAAADd3d0KAAAAACgAAAAoAAAAZAAAAGQAAAAAAAAAzMzMAAAAAABQAAAAUAAAAGQAAABkAAAAAAAAABcAAAAUAAAAAAAAAAAAAAD/fwAA/38AAAAAAAAJAAAABAAAAAYAAAAMAAAAEAAAAAAAAAAAAAAAAAAAAAAAAAAeAAAAaAAAAAAAAAAAAAAAAAAAAAAAAAAAAAAAECcAABAnAAAAAAAAAAAAAAAAAAAAAAAAAAAAAAAAAAAAAAAAAAAAABQAAAAAAAAAwMD/AAAAAABkAAAAMgAAAAAAAABkAAAAAAAAAH9/fwAKAAAAHwAAAFQAAACmtycF////AQAAAAAAAAAAAAAAAAAAAAAAAAAAAAAAAAAAAAAAAAAAAAAAAH9/fwDd3d0DzMzMAMDA/wB/f38AAAAAAAAAAAAAAAAAAAAAAAAAAAAhAAAAGAAAABQAAADnBAAAXAkAAHQkAABsKQAAACAAACYAAAAIAAAA//////////8="/>
+              </a:ext>
+            </a:extLst>
+          </p:cNvSpPr>
+          <p:nvPr/>
+        </p:nvSpPr>
+        <p:spPr>
+          <a:xfrm>
+            <a:off x="1005930" y="940526"/>
+            <a:ext cx="10306504" cy="5499463"/>
+          </a:xfrm>
+          <a:prstGeom prst="rect">
+            <a:avLst/>
+          </a:prstGeom>
+          <a:noFill/>
+          <a:ln>
+            <a:noFill/>
+          </a:ln>
+          <a:effectLst/>
+        </p:spPr>
+        <p:txBody>
+          <a:bodyPr vert="horz" wrap="square" lIns="91440" tIns="45720" rIns="91440" bIns="45720" numCol="1" spcCol="215900" anchor="t"/>
+          <a:lstStyle/>
+          <a:p>
+            <a:pPr>
+              <a:lnSpc>
+                <a:spcPct val="200000"/>
+              </a:lnSpc>
+              <a:defRPr lang="es-es" sz="2100"/>
+            </a:pPr>
+            <a:r>
+              <a:rPr dirty="0"/>
+              <a:t>En el proceso de limpieza se realizo</a:t>
+            </a:r>
+            <a:r>
+              <a:rPr dirty="0" smtClean="0"/>
+              <a:t>:</a:t>
+            </a:r>
             <a:endParaRPr dirty="0"/>
           </a:p>
           <a:p>
@@ -13552,58 +14117,59 @@
               <a:rPr dirty="0" smtClean="0"/>
               <a:t>: </a:t>
             </a:r>
-            <a:r>
-              <a:rPr sz="1600" dirty="0" smtClean="0"/>
-              <a:t>Se limpiaron datos sobre las cantidades semanales y acumulados mensuales de pack de datos, </a:t>
-            </a:r>
-            <a:r>
-              <a:rPr sz="1600" dirty="0" err="1" smtClean="0"/>
-              <a:t>sms</a:t>
-            </a:r>
-            <a:r>
-              <a:rPr sz="1600" dirty="0" smtClean="0"/>
-              <a:t> y voz. Estos datos eran incorrectos debido a una mala </a:t>
-            </a:r>
-            <a:r>
-              <a:rPr sz="1600" dirty="0" err="1" smtClean="0"/>
-              <a:t>recolecci</a:t>
-            </a:r>
-            <a:r>
-              <a:rPr lang="es-MX" sz="1600" dirty="0" err="1" smtClean="0"/>
-              <a:t>ó</a:t>
-            </a:r>
-            <a:r>
-              <a:rPr sz="1600" dirty="0" smtClean="0"/>
-              <a:t>n de los datos por parte del </a:t>
-            </a:r>
-            <a:r>
-              <a:rPr lang="es-MX" sz="1600" dirty="0" smtClean="0"/>
-              <a:t>á</a:t>
-            </a:r>
-            <a:r>
-              <a:rPr sz="1600" dirty="0" smtClean="0"/>
-              <a:t>rea de DB.</a:t>
-            </a:r>
-            <a:endParaRPr sz="1600" dirty="0"/>
-          </a:p>
-          <a:p>
-            <a:pPr marL="342900" indent="-342900">
+          </a:p>
+          <a:p>
+            <a:pPr lvl="1">
               <a:lnSpc>
                 <a:spcPct val="200000"/>
               </a:lnSpc>
-              <a:buFont typeface="Arial" panose="020B0604020202020204" pitchFamily="34" charset="0"/>
-              <a:buChar char="•"/>
               <a:defRPr lang="es-es" sz="2100"/>
             </a:pPr>
             <a:r>
-              <a:rPr u="sng" dirty="0"/>
-              <a:t>En cuanto a </a:t>
-            </a:r>
-            <a:r>
-              <a:rPr u="sng" dirty="0" err="1" smtClean="0"/>
-              <a:t>outliers</a:t>
-            </a:r>
-            <a:endParaRPr u="sng" dirty="0"/>
+              <a:rPr sz="2100" dirty="0" smtClean="0"/>
+              <a:t>Se limpiaron datos sobre las cantidades semanales y acumulados mensuales de pack de datos, </a:t>
+            </a:r>
+            <a:r>
+              <a:rPr sz="2100" dirty="0" err="1" smtClean="0"/>
+              <a:t>sms</a:t>
+            </a:r>
+            <a:r>
+              <a:rPr sz="2100" dirty="0" smtClean="0"/>
+              <a:t> y voz. Estos datos eran incorrectos debido a una mala </a:t>
+            </a:r>
+            <a:r>
+              <a:rPr sz="2100" dirty="0" err="1" smtClean="0"/>
+              <a:t>recolecci</a:t>
+            </a:r>
+            <a:r>
+              <a:rPr lang="es-MX" sz="2100" dirty="0" err="1" smtClean="0"/>
+              <a:t>ó</a:t>
+            </a:r>
+            <a:r>
+              <a:rPr sz="2100" dirty="0" smtClean="0"/>
+              <a:t>n de los datos por parte del </a:t>
+            </a:r>
+            <a:r>
+              <a:rPr lang="es-MX" sz="2100" dirty="0" smtClean="0"/>
+              <a:t>á</a:t>
+            </a:r>
+            <a:r>
+              <a:rPr sz="2100" dirty="0" smtClean="0"/>
+              <a:t>rea de DB. Esto </a:t>
+            </a:r>
+            <a:r>
+              <a:rPr sz="2100" dirty="0" err="1" smtClean="0"/>
+              <a:t>tambi</a:t>
+            </a:r>
+            <a:r>
+              <a:rPr lang="es-MX" sz="2100" dirty="0" smtClean="0"/>
+              <a:t>é</a:t>
+            </a:r>
+            <a:r>
+              <a:rPr sz="2100" dirty="0" smtClean="0"/>
+              <a:t>n aplica para las recargas. </a:t>
+            </a:r>
+            <a:endParaRPr sz="2100" dirty="0"/>
           </a:p>
         </p:txBody>
       </p:sp>
@@ -13640,7 +14206,242 @@
     </p:spTree>
     <p:extLst>
       <p:ext uri="{BB962C8B-B14F-4D97-AF65-F5344CB8AC3E}">
-        <p14:creationId xmlns:p14="http://schemas.microsoft.com/office/powerpoint/2010/main" val="2332238334"/>
+        <p14:creationId xmlns:p14="http://schemas.microsoft.com/office/powerpoint/2010/main" val="4241633670"/>
+      </p:ext>
+    </p:extLst>
+  </p:cSld>
+  <p:clrMapOvr>
+    <a:masterClrMapping/>
+  </p:clrMapOvr>
+</p:sld>
+</file>
+
+<file path=ppt/slides/slide9.xml><?xml version="1.0" encoding="utf-8"?>
+<p:sld xmlns:a="http://schemas.openxmlformats.org/drawingml/2006/main" xmlns:r="http://schemas.openxmlformats.org/officeDocument/2006/relationships" xmlns:p="http://schemas.openxmlformats.org/presentationml/2006/main">
+  <p:cSld>
+    <p:spTree>
+      <p:nvGrpSpPr>
+        <p:cNvPr id="1" name=""/>
+        <p:cNvGrpSpPr/>
+        <p:nvPr/>
+      </p:nvGrpSpPr>
+      <p:grpSpPr>
+        <a:xfrm>
+          <a:off x="0" y="0"/>
+          <a:ext cx="0" cy="0"/>
+          <a:chOff x="0" y="0"/>
+          <a:chExt cx="0" cy="0"/>
+        </a:xfrm>
+      </p:grpSpPr>
+      <p:sp>
+        <p:nvSpPr>
+          <p:cNvPr id="2" name="Título 1"/>
+          <p:cNvSpPr>
+            <a:spLocks noGrp="1"/>
+          </p:cNvSpPr>
+          <p:nvPr>
+            <p:ph type="title"/>
+          </p:nvPr>
+        </p:nvSpPr>
+        <p:spPr>
+          <a:xfrm>
+            <a:off x="1285105" y="239695"/>
+            <a:ext cx="4083730" cy="700831"/>
+          </a:xfrm>
+        </p:spPr>
+        <p:txBody>
+          <a:bodyPr/>
+          <a:lstStyle/>
+          <a:p>
+            <a:r>
+              <a:rPr lang="es-MX" dirty="0" smtClean="0"/>
+              <a:t>Limpieza de datos</a:t>
+            </a:r>
+            <a:endParaRPr lang="es-MX" dirty="0"/>
+          </a:p>
+        </p:txBody>
+      </p:sp>
+      <p:sp>
+        <p:nvSpPr>
+          <p:cNvPr id="4" name="CuadroTexto 5"/>
+          <p:cNvSpPr>
+            <a:extLst>
+              <a:ext uri="smNativeData">
+                <pr:smNativeData xmlns="" xmlns:p14="http://schemas.microsoft.com/office/powerpoint/2010/main" xmlns:pr="smNativeData" val="SMDATA_13_SgSuXhMAAAAlAAAAZAAAAE0AAAAAkAAAAEgAAACQAAAASAAAAAAAAAAAAAAAAAAAAAEAAABQAAAAAAAAAAAA4D8AAAAAAADgPwAAAAAAAOA/AAAAAAAA4D8AAAAAAADgPwAAAAAAAOA/AAAAAAAA4D8AAAAAAADgPwAAAAAAAOA/AAAAAAAA4D8CAAAAjAAAAAAAAAAAAAAAprcnDP///wgAAAAAAAAAAAAAAAAAAAAAAAAAAAAAAAAAAAAAZAAAAAEAAABAAAAAAAAAAAAAAAAAAAAAAAAAAAAAAAAAAAAAAAAAAAAAAAAAAAAAAAAAAAAAAAAAAAAAAAAAAAAAAAAAAAAAAAAAAAAAAAAAAAAAAAAAAAAAAAAAAAAAFAAAADwAAAAAAAAAAAAAAAAAAAAPAAAAAQAAACMAAAAjAAAAIwAAAB4AAAAAAAAAZAAAAGQAAAAAAAAAZAAAAGQAAAAVAAAAYAAAAAAAAAAAAAAADwAAACADAAAAAAAAAAAAAAEAAACgMgAAVgcAAKr4//8BAAAAf39/AAEAAABkAAAAAAAAABQAAABAHwAAAAAAACYAAAAAAAAAwOD//wAAAAAmAAAAZAAAABYAAABMAAAAAAAAAAAAAAAEAAAAAAAAAAEAAADd3d0KAAAAACgAAAAoAAAAZAAAAGQAAAAAAAAAzMzMAAAAAABQAAAAUAAAAGQAAABkAAAAAAAAABcAAAAUAAAAAAAAAAAAAAD/fwAA/38AAAAAAAAJAAAABAAAAAYAAAAMAAAAEAAAAAAAAAAAAAAAAAAAAAAAAAAeAAAAaAAAAAAAAAAAAAAAAAAAAAAAAAAAAAAAECcAABAnAAAAAAAAAAAAAAAAAAAAAAAAAAAAAAAAAAAAAAAAAAAAABQAAAAAAAAAwMD/AAAAAABkAAAAMgAAAAAAAABkAAAAAAAAAH9/fwAKAAAAHwAAAFQAAACmtycF////AQAAAAAAAAAAAAAAAAAAAAAAAAAAAAAAAAAAAAAAAAAAAAAAAH9/fwDd3d0DzMzMAMDA/wB/f38AAAAAAAAAAAAAAAAAAAAAAAAAAAAhAAAAGAAAABQAAADnBAAAXAkAAHQkAABsKQAAACAAACYAAAAIAAAA//////////8="/>
+              </a:ext>
+            </a:extLst>
+          </p:cNvSpPr>
+          <p:nvPr/>
+        </p:nvSpPr>
+        <p:spPr>
+          <a:xfrm>
+            <a:off x="1005930" y="940526"/>
+            <a:ext cx="10306504" cy="5499463"/>
+          </a:xfrm>
+          <a:prstGeom prst="rect">
+            <a:avLst/>
+          </a:prstGeom>
+          <a:noFill/>
+          <a:ln>
+            <a:noFill/>
+          </a:ln>
+          <a:effectLst/>
+        </p:spPr>
+        <p:txBody>
+          <a:bodyPr vert="horz" wrap="square" lIns="91440" tIns="45720" rIns="91440" bIns="45720" numCol="1" spcCol="215900" anchor="t"/>
+          <a:lstStyle/>
+          <a:p>
+            <a:pPr>
+              <a:lnSpc>
+                <a:spcPct val="200000"/>
+              </a:lnSpc>
+              <a:defRPr lang="es-es" sz="2100"/>
+            </a:pPr>
+            <a:r>
+              <a:rPr dirty="0"/>
+              <a:t>En el proceso de limpieza se realizo</a:t>
+            </a:r>
+            <a:r>
+              <a:rPr dirty="0" smtClean="0"/>
+              <a:t>:</a:t>
+            </a:r>
+            <a:endParaRPr dirty="0"/>
+          </a:p>
+          <a:p>
+            <a:pPr marL="342900" indent="-342900">
+              <a:lnSpc>
+                <a:spcPct val="200000"/>
+              </a:lnSpc>
+              <a:buFont typeface="Arial" panose="020B0604020202020204" pitchFamily="34" charset="0"/>
+              <a:buChar char="•"/>
+              <a:defRPr lang="es-es" sz="2100"/>
+            </a:pPr>
+            <a:r>
+              <a:rPr u="sng" dirty="0" smtClean="0"/>
+              <a:t>En </a:t>
+            </a:r>
+            <a:r>
+              <a:rPr u="sng" dirty="0"/>
+              <a:t>cuanto a </a:t>
+            </a:r>
+            <a:r>
+              <a:rPr u="sng" dirty="0" err="1" smtClean="0"/>
+              <a:t>outliers</a:t>
+            </a:r>
+            <a:r>
+              <a:rPr u="sng" dirty="0" smtClean="0"/>
+              <a:t>:</a:t>
+            </a:r>
+          </a:p>
+          <a:p>
+            <a:pPr>
+              <a:lnSpc>
+                <a:spcPct val="200000"/>
+              </a:lnSpc>
+              <a:defRPr lang="es-es" sz="2100"/>
+            </a:pPr>
+            <a:r>
+              <a:rPr lang="es-ES" dirty="0"/>
+              <a:t>Encontramos </a:t>
+            </a:r>
+            <a:r>
+              <a:rPr lang="es-ES" dirty="0" err="1"/>
+              <a:t>outliers</a:t>
+            </a:r>
+            <a:r>
+              <a:rPr lang="es-ES" dirty="0"/>
+              <a:t>  para el trafico de datos y de </a:t>
+            </a:r>
+            <a:r>
+              <a:rPr lang="es-ES" dirty="0" smtClean="0"/>
+              <a:t>voz</a:t>
+            </a:r>
+            <a:r>
+              <a:rPr lang="es-ES" dirty="0"/>
+              <a:t>.</a:t>
+            </a:r>
+            <a:endParaRPr u="sng" dirty="0" smtClean="0"/>
+          </a:p>
+          <a:p>
+            <a:pPr>
+              <a:lnSpc>
+                <a:spcPct val="200000"/>
+              </a:lnSpc>
+              <a:defRPr lang="es-es" sz="2100"/>
+            </a:pPr>
+            <a:r>
+              <a:rPr lang="es-ES" dirty="0" smtClean="0"/>
+              <a:t>Para imputar los </a:t>
+            </a:r>
+            <a:r>
+              <a:rPr lang="es-ES" dirty="0" err="1" smtClean="0"/>
+              <a:t>outliers</a:t>
+            </a:r>
+            <a:r>
+              <a:rPr lang="es-ES" dirty="0" smtClean="0"/>
+              <a:t> dependiendo cuan distribuidos </a:t>
+            </a:r>
+            <a:r>
+              <a:rPr lang="es-ES" dirty="0" err="1" smtClean="0"/>
+              <a:t>uniformente</a:t>
+            </a:r>
+            <a:r>
+              <a:rPr lang="es-ES" dirty="0" smtClean="0"/>
+              <a:t> estaban los datos utilizamos la media o la mediana. Para definir el rango </a:t>
+            </a:r>
+            <a:r>
+              <a:rPr lang="es-ES" dirty="0" err="1" smtClean="0"/>
+              <a:t>interquartil</a:t>
+            </a:r>
+            <a:r>
+              <a:rPr lang="es-ES" dirty="0" smtClean="0"/>
+              <a:t> (IQR) usamos el Q1 y Q3, que luego de multiplicarlos por 1.5 nos definirán los valores que se consideran como </a:t>
+            </a:r>
+            <a:r>
+              <a:rPr lang="es-ES" dirty="0" err="1" smtClean="0"/>
+              <a:t>outliers</a:t>
+            </a:r>
+            <a:r>
+              <a:rPr lang="es-ES" dirty="0" smtClean="0"/>
+              <a:t>.</a:t>
+            </a:r>
+          </a:p>
+        </p:txBody>
+      </p:sp>
+      <p:pic>
+        <p:nvPicPr>
+          <p:cNvPr id="7" name="Imagen 6"/>
+          <p:cNvPicPr>
+            <a:picLocks noChangeAspect="1"/>
+          </p:cNvPicPr>
+          <p:nvPr/>
+        </p:nvPicPr>
+        <p:blipFill>
+          <a:blip r:embed="rId2">
+            <a:extLst>
+              <a:ext uri="{28A0092B-C50C-407E-A947-70E740481C1C}">
+                <a14:useLocalDpi xmlns:a14="http://schemas.microsoft.com/office/drawing/2010/main" val="0"/>
+              </a:ext>
+            </a:extLst>
+          </a:blip>
+          <a:stretch>
+            <a:fillRect/>
+          </a:stretch>
+        </p:blipFill>
+        <p:spPr>
+          <a:xfrm>
+            <a:off x="8483221" y="590110"/>
+            <a:ext cx="2385076" cy="2319129"/>
+          </a:xfrm>
+          <a:prstGeom prst="rect">
+            <a:avLst/>
+          </a:prstGeom>
+        </p:spPr>
+      </p:pic>
+    </p:spTree>
+    <p:extLst>
+      <p:ext uri="{BB962C8B-B14F-4D97-AF65-F5344CB8AC3E}">
+        <p14:creationId xmlns:p14="http://schemas.microsoft.com/office/powerpoint/2010/main" val="412317017"/>
       </p:ext>
     </p:extLst>
   </p:cSld>

</xml_diff>